<commit_message>
minor update to Robustness/RobustnessAnalysis_02142019.pptx
</commit_message>
<xml_diff>
--- a/Software/Geri_Model_Package/Robustness/RobustnessAnalysis_02142019.pptx
+++ b/Software/Geri_Model_Package/Robustness/RobustnessAnalysis_02142019.pptx
@@ -118,6 +118,11 @@
       </a:defRPr>
     </a:lvl9pPr>
   </p:defaultTextStyle>
+  <p:extLst>
+    <p:ext uri="{EFAFB233-063F-42B5-8137-9DF3F51BA10A}">
+      <p15:sldGuideLst xmlns:p15="http://schemas.microsoft.com/office/powerpoint/2012/main"/>
+    </p:ext>
+  </p:extLst>
 </p:presentation>
 </file>
 
@@ -268,7 +273,7 @@
           <a:p>
             <a:fld id="{FCE4FD93-E6F5-4F39-9C9D-0016CD56957B}" type="datetimeFigureOut">
               <a:rPr lang="en-US" smtClean="0"/>
-              <a:t>2/14/2019</a:t>
+              <a:t>2/15/2019</a:t>
             </a:fld>
             <a:endParaRPr lang="en-US"/>
           </a:p>
@@ -466,7 +471,7 @@
           <a:p>
             <a:fld id="{FCE4FD93-E6F5-4F39-9C9D-0016CD56957B}" type="datetimeFigureOut">
               <a:rPr lang="en-US" smtClean="0"/>
-              <a:t>2/14/2019</a:t>
+              <a:t>2/15/2019</a:t>
             </a:fld>
             <a:endParaRPr lang="en-US"/>
           </a:p>
@@ -674,7 +679,7 @@
           <a:p>
             <a:fld id="{FCE4FD93-E6F5-4F39-9C9D-0016CD56957B}" type="datetimeFigureOut">
               <a:rPr lang="en-US" smtClean="0"/>
-              <a:t>2/14/2019</a:t>
+              <a:t>2/15/2019</a:t>
             </a:fld>
             <a:endParaRPr lang="en-US"/>
           </a:p>
@@ -872,7 +877,7 @@
           <a:p>
             <a:fld id="{FCE4FD93-E6F5-4F39-9C9D-0016CD56957B}" type="datetimeFigureOut">
               <a:rPr lang="en-US" smtClean="0"/>
-              <a:t>2/14/2019</a:t>
+              <a:t>2/15/2019</a:t>
             </a:fld>
             <a:endParaRPr lang="en-US"/>
           </a:p>
@@ -1147,7 +1152,7 @@
           <a:p>
             <a:fld id="{FCE4FD93-E6F5-4F39-9C9D-0016CD56957B}" type="datetimeFigureOut">
               <a:rPr lang="en-US" smtClean="0"/>
-              <a:t>2/14/2019</a:t>
+              <a:t>2/15/2019</a:t>
             </a:fld>
             <a:endParaRPr lang="en-US"/>
           </a:p>
@@ -1412,7 +1417,7 @@
           <a:p>
             <a:fld id="{FCE4FD93-E6F5-4F39-9C9D-0016CD56957B}" type="datetimeFigureOut">
               <a:rPr lang="en-US" smtClean="0"/>
-              <a:t>2/14/2019</a:t>
+              <a:t>2/15/2019</a:t>
             </a:fld>
             <a:endParaRPr lang="en-US"/>
           </a:p>
@@ -1824,7 +1829,7 @@
           <a:p>
             <a:fld id="{FCE4FD93-E6F5-4F39-9C9D-0016CD56957B}" type="datetimeFigureOut">
               <a:rPr lang="en-US" smtClean="0"/>
-              <a:t>2/14/2019</a:t>
+              <a:t>2/15/2019</a:t>
             </a:fld>
             <a:endParaRPr lang="en-US"/>
           </a:p>
@@ -1965,7 +1970,7 @@
           <a:p>
             <a:fld id="{FCE4FD93-E6F5-4F39-9C9D-0016CD56957B}" type="datetimeFigureOut">
               <a:rPr lang="en-US" smtClean="0"/>
-              <a:t>2/14/2019</a:t>
+              <a:t>2/15/2019</a:t>
             </a:fld>
             <a:endParaRPr lang="en-US"/>
           </a:p>
@@ -2078,7 +2083,7 @@
           <a:p>
             <a:fld id="{FCE4FD93-E6F5-4F39-9C9D-0016CD56957B}" type="datetimeFigureOut">
               <a:rPr lang="en-US" smtClean="0"/>
-              <a:t>2/14/2019</a:t>
+              <a:t>2/15/2019</a:t>
             </a:fld>
             <a:endParaRPr lang="en-US"/>
           </a:p>
@@ -2389,7 +2394,7 @@
           <a:p>
             <a:fld id="{FCE4FD93-E6F5-4F39-9C9D-0016CD56957B}" type="datetimeFigureOut">
               <a:rPr lang="en-US" smtClean="0"/>
-              <a:t>2/14/2019</a:t>
+              <a:t>2/15/2019</a:t>
             </a:fld>
             <a:endParaRPr lang="en-US"/>
           </a:p>
@@ -2677,7 +2682,7 @@
           <a:p>
             <a:fld id="{FCE4FD93-E6F5-4F39-9C9D-0016CD56957B}" type="datetimeFigureOut">
               <a:rPr lang="en-US" smtClean="0"/>
-              <a:t>2/14/2019</a:t>
+              <a:t>2/15/2019</a:t>
             </a:fld>
             <a:endParaRPr lang="en-US"/>
           </a:p>
@@ -2918,7 +2923,7 @@
           <a:p>
             <a:fld id="{FCE4FD93-E6F5-4F39-9C9D-0016CD56957B}" type="datetimeFigureOut">
               <a:rPr lang="en-US" smtClean="0"/>
-              <a:t>2/14/2019</a:t>
+              <a:t>2/15/2019</a:t>
             </a:fld>
             <a:endParaRPr lang="en-US"/>
           </a:p>
@@ -3381,7 +3386,9 @@
         </p:nvSpPr>
         <p:spPr/>
         <p:txBody>
-          <a:bodyPr/>
+          <a:bodyPr>
+            <a:normAutofit lnSpcReduction="10000"/>
+          </a:bodyPr>
           <a:lstStyle/>
           <a:p>
             <a:r>
@@ -3413,6 +3420,21 @@
             <a:r>
               <a:rPr lang="en-US" dirty="0"/>
               <a:t>Individual RFS calculated at all individual criteria: Classical loop-at-a-time for: Input GM, Input PM, Output GM, Output PM; Multi-loop Input Disk Gain Margin</a:t>
+            </a:r>
+          </a:p>
+          <a:p>
+            <a:pPr lvl="1"/>
+            <a:r>
+              <a:rPr lang="en-US" dirty="0"/>
+              <a:t>Threshold criteria: 6 dB GM, 45</a:t>
+            </a:r>
+            <a:r>
+              <a:rPr lang="en-US" baseline="30000" dirty="0"/>
+              <a:t>o</a:t>
+            </a:r>
+            <a:r>
+              <a:rPr lang="en-US" dirty="0"/>
+              <a:t> PM</a:t>
             </a:r>
           </a:p>
           <a:p>

</xml_diff>

<commit_message>
minor updates to Robustness/RobustnessAnalysis_02142019.pptx
</commit_message>
<xml_diff>
--- a/Software/Geri_Model_Package/Robustness/RobustnessAnalysis_02142019.pptx
+++ b/Software/Geri_Model_Package/Robustness/RobustnessAnalysis_02142019.pptx
@@ -3387,7 +3387,7 @@
         <p:spPr/>
         <p:txBody>
           <a:bodyPr>
-            <a:normAutofit lnSpcReduction="10000"/>
+            <a:normAutofit fontScale="85000" lnSpcReduction="10000"/>
           </a:bodyPr>
           <a:lstStyle/>
           <a:p>
@@ -3441,6 +3441,42 @@
             <a:r>
               <a:rPr lang="en-US" dirty="0"/>
               <a:t>Absolute RFS is based on Classical loop-at-a-time criteria only</a:t>
+            </a:r>
+          </a:p>
+          <a:p>
+            <a:r>
+              <a:rPr lang="en-US" dirty="0"/>
+              <a:t>Code: </a:t>
+            </a:r>
+            <a:r>
+              <a:rPr lang="en-US" dirty="0" err="1"/>
+              <a:t>RobustnessAnalysisAP.m</a:t>
+            </a:r>
+            <a:r>
+              <a:rPr lang="en-US" dirty="0"/>
+              <a:t> (2/14/2019)</a:t>
+            </a:r>
+          </a:p>
+          <a:p>
+            <a:r>
+              <a:rPr lang="en-US" dirty="0"/>
+              <a:t>Geri model includes actuator dynamics with 25 sec. time delay (4</a:t>
+            </a:r>
+            <a:r>
+              <a:rPr lang="en-US" baseline="30000" dirty="0"/>
+              <a:t>th</a:t>
+            </a:r>
+            <a:r>
+              <a:rPr lang="en-US" dirty="0"/>
+              <a:t> order </a:t>
+            </a:r>
+            <a:r>
+              <a:rPr lang="en-US" dirty="0" err="1"/>
+              <a:t>Pade</a:t>
+            </a:r>
+            <a:r>
+              <a:rPr lang="en-US" dirty="0"/>
+              <a:t>) and sensor dynamics (no engine dynamics currently)</a:t>
             </a:r>
           </a:p>
         </p:txBody>
@@ -4352,7 +4388,7 @@
         <p:spPr/>
         <p:txBody>
           <a:bodyPr>
-            <a:normAutofit fontScale="70000" lnSpcReduction="20000"/>
+            <a:normAutofit fontScale="62500" lnSpcReduction="20000"/>
           </a:bodyPr>
           <a:lstStyle/>
           <a:p>
@@ -4372,7 +4408,7 @@
             <a:pPr lvl="1"/>
             <a:r>
               <a:rPr lang="en-US" dirty="0"/>
-              <a:t>L2</a:t>
+              <a:t>R1</a:t>
             </a:r>
           </a:p>
           <a:p>
@@ -4493,6 +4529,12 @@
             <a:r>
               <a:rPr lang="en-US" dirty="0"/>
               <a:t>15 states</a:t>
+            </a:r>
+          </a:p>
+          <a:p>
+            <a:r>
+              <a:rPr lang="en-US" dirty="0"/>
+              <a:t>Targets 2 flutter modes</a:t>
             </a:r>
           </a:p>
         </p:txBody>
@@ -4574,7 +4616,7 @@
         <p:spPr/>
         <p:txBody>
           <a:bodyPr>
-            <a:normAutofit fontScale="70000" lnSpcReduction="20000"/>
+            <a:normAutofit fontScale="62500" lnSpcReduction="20000"/>
           </a:bodyPr>
           <a:lstStyle/>
           <a:p>
@@ -4594,7 +4636,7 @@
             <a:pPr lvl="1"/>
             <a:r>
               <a:rPr lang="en-US" dirty="0"/>
-              <a:t>L2</a:t>
+              <a:t>R1</a:t>
             </a:r>
           </a:p>
           <a:p>
@@ -4715,6 +4757,12 @@
             <a:r>
               <a:rPr lang="en-US" dirty="0"/>
               <a:t>2 states</a:t>
+            </a:r>
+          </a:p>
+          <a:p>
+            <a:r>
+              <a:rPr lang="en-US" dirty="0"/>
+              <a:t>Targets 2 flutter modes</a:t>
             </a:r>
           </a:p>
           <a:p>
@@ -4799,7 +4847,9 @@
         </p:nvSpPr>
         <p:spPr/>
         <p:txBody>
-          <a:bodyPr/>
+          <a:bodyPr>
+            <a:normAutofit lnSpcReduction="10000"/>
+          </a:bodyPr>
           <a:lstStyle/>
           <a:p>
             <a:r>
@@ -4845,7 +4895,7 @@
           <a:p>
             <a:r>
               <a:rPr lang="en-US" dirty="0"/>
-              <a:t>Gain scheduled with airspeed</a:t>
+              <a:t>Gain scheduled with airspeed – a net gain, no change in dynamics.</a:t>
             </a:r>
           </a:p>
           <a:p>
@@ -4857,7 +4907,13 @@
           <a:p>
             <a:r>
               <a:rPr lang="en-US" dirty="0"/>
-              <a:t>Controller designed SISO: input is difference between accelerometers</a:t>
+              <a:t>Controller designed SISO: output is difference between accelerometers</a:t>
+            </a:r>
+          </a:p>
+          <a:p>
+            <a:r>
+              <a:rPr lang="en-US" dirty="0"/>
+              <a:t>Targets a single flutter mode</a:t>
             </a:r>
           </a:p>
         </p:txBody>

</xml_diff>

<commit_message>
updated RobustnessAnalysis_02142019.pptx to reflect Pete's bug fix in DisplayLoopmargin.m
</commit_message>
<xml_diff>
--- a/Software/Geri_Model_Package/Robustness/RobustnessAnalysis_02142019.pptx
+++ b/Software/Geri_Model_Package/Robustness/RobustnessAnalysis_02142019.pptx
@@ -273,7 +273,7 @@
           <a:p>
             <a:fld id="{FCE4FD93-E6F5-4F39-9C9D-0016CD56957B}" type="datetimeFigureOut">
               <a:rPr lang="en-US" smtClean="0"/>
-              <a:t>2/15/2019</a:t>
+              <a:t>2/17/2019</a:t>
             </a:fld>
             <a:endParaRPr lang="en-US"/>
           </a:p>
@@ -471,7 +471,7 @@
           <a:p>
             <a:fld id="{FCE4FD93-E6F5-4F39-9C9D-0016CD56957B}" type="datetimeFigureOut">
               <a:rPr lang="en-US" smtClean="0"/>
-              <a:t>2/15/2019</a:t>
+              <a:t>2/17/2019</a:t>
             </a:fld>
             <a:endParaRPr lang="en-US"/>
           </a:p>
@@ -679,7 +679,7 @@
           <a:p>
             <a:fld id="{FCE4FD93-E6F5-4F39-9C9D-0016CD56957B}" type="datetimeFigureOut">
               <a:rPr lang="en-US" smtClean="0"/>
-              <a:t>2/15/2019</a:t>
+              <a:t>2/17/2019</a:t>
             </a:fld>
             <a:endParaRPr lang="en-US"/>
           </a:p>
@@ -877,7 +877,7 @@
           <a:p>
             <a:fld id="{FCE4FD93-E6F5-4F39-9C9D-0016CD56957B}" type="datetimeFigureOut">
               <a:rPr lang="en-US" smtClean="0"/>
-              <a:t>2/15/2019</a:t>
+              <a:t>2/17/2019</a:t>
             </a:fld>
             <a:endParaRPr lang="en-US"/>
           </a:p>
@@ -1152,7 +1152,7 @@
           <a:p>
             <a:fld id="{FCE4FD93-E6F5-4F39-9C9D-0016CD56957B}" type="datetimeFigureOut">
               <a:rPr lang="en-US" smtClean="0"/>
-              <a:t>2/15/2019</a:t>
+              <a:t>2/17/2019</a:t>
             </a:fld>
             <a:endParaRPr lang="en-US"/>
           </a:p>
@@ -1417,7 +1417,7 @@
           <a:p>
             <a:fld id="{FCE4FD93-E6F5-4F39-9C9D-0016CD56957B}" type="datetimeFigureOut">
               <a:rPr lang="en-US" smtClean="0"/>
-              <a:t>2/15/2019</a:t>
+              <a:t>2/17/2019</a:t>
             </a:fld>
             <a:endParaRPr lang="en-US"/>
           </a:p>
@@ -1829,7 +1829,7 @@
           <a:p>
             <a:fld id="{FCE4FD93-E6F5-4F39-9C9D-0016CD56957B}" type="datetimeFigureOut">
               <a:rPr lang="en-US" smtClean="0"/>
-              <a:t>2/15/2019</a:t>
+              <a:t>2/17/2019</a:t>
             </a:fld>
             <a:endParaRPr lang="en-US"/>
           </a:p>
@@ -1970,7 +1970,7 @@
           <a:p>
             <a:fld id="{FCE4FD93-E6F5-4F39-9C9D-0016CD56957B}" type="datetimeFigureOut">
               <a:rPr lang="en-US" smtClean="0"/>
-              <a:t>2/15/2019</a:t>
+              <a:t>2/17/2019</a:t>
             </a:fld>
             <a:endParaRPr lang="en-US"/>
           </a:p>
@@ -2083,7 +2083,7 @@
           <a:p>
             <a:fld id="{FCE4FD93-E6F5-4F39-9C9D-0016CD56957B}" type="datetimeFigureOut">
               <a:rPr lang="en-US" smtClean="0"/>
-              <a:t>2/15/2019</a:t>
+              <a:t>2/17/2019</a:t>
             </a:fld>
             <a:endParaRPr lang="en-US"/>
           </a:p>
@@ -2394,7 +2394,7 @@
           <a:p>
             <a:fld id="{FCE4FD93-E6F5-4F39-9C9D-0016CD56957B}" type="datetimeFigureOut">
               <a:rPr lang="en-US" smtClean="0"/>
-              <a:t>2/15/2019</a:t>
+              <a:t>2/17/2019</a:t>
             </a:fld>
             <a:endParaRPr lang="en-US"/>
           </a:p>
@@ -2682,7 +2682,7 @@
           <a:p>
             <a:fld id="{FCE4FD93-E6F5-4F39-9C9D-0016CD56957B}" type="datetimeFigureOut">
               <a:rPr lang="en-US" smtClean="0"/>
-              <a:t>2/15/2019</a:t>
+              <a:t>2/17/2019</a:t>
             </a:fld>
             <a:endParaRPr lang="en-US"/>
           </a:p>
@@ -2923,7 +2923,7 @@
           <a:p>
             <a:fld id="{FCE4FD93-E6F5-4F39-9C9D-0016CD56957B}" type="datetimeFigureOut">
               <a:rPr lang="en-US" smtClean="0"/>
-              <a:t>2/15/2019</a:t>
+              <a:t>2/17/2019</a:t>
             </a:fld>
             <a:endParaRPr lang="en-US"/>
           </a:p>
@@ -3571,10 +3571,10 @@
       </p:pic>
       <p:pic>
         <p:nvPicPr>
-          <p:cNvPr id="7" name="Picture 6">
-            <a:extLst>
-              <a:ext uri="{FF2B5EF4-FFF2-40B4-BE49-F238E27FC236}">
-                <a16:creationId xmlns:a16="http://schemas.microsoft.com/office/drawing/2014/main" id="{6CA7FA91-988E-430C-B5DA-77DC813D8218}"/>
+          <p:cNvPr id="3" name="Picture 2">
+            <a:extLst>
+              <a:ext uri="{FF2B5EF4-FFF2-40B4-BE49-F238E27FC236}">
+                <a16:creationId xmlns:a16="http://schemas.microsoft.com/office/drawing/2014/main" id="{EB0BC003-859C-4847-8285-8503FD47CA8E}"/>
               </a:ext>
             </a:extLst>
           </p:cNvPr>
@@ -3591,7 +3591,7 @@
         </p:blipFill>
         <p:spPr>
           <a:xfrm>
-            <a:off x="6535332" y="1947638"/>
+            <a:off x="6313950" y="1947638"/>
             <a:ext cx="5166001" cy="3906000"/>
           </a:xfrm>
           <a:prstGeom prst="rect">
@@ -3659,10 +3659,10 @@
       </p:sp>
       <p:pic>
         <p:nvPicPr>
-          <p:cNvPr id="7" name="Picture 6">
-            <a:extLst>
-              <a:ext uri="{FF2B5EF4-FFF2-40B4-BE49-F238E27FC236}">
-                <a16:creationId xmlns:a16="http://schemas.microsoft.com/office/drawing/2014/main" id="{E5F299A8-7375-4A27-925B-CC84BA3D340F}"/>
+          <p:cNvPr id="8" name="Picture 7">
+            <a:extLst>
+              <a:ext uri="{FF2B5EF4-FFF2-40B4-BE49-F238E27FC236}">
+                <a16:creationId xmlns:a16="http://schemas.microsoft.com/office/drawing/2014/main" id="{AAC3619A-308F-4FB7-A32F-365ED649EBFC}"/>
               </a:ext>
             </a:extLst>
           </p:cNvPr>
@@ -3679,8 +3679,8 @@
         </p:blipFill>
         <p:spPr>
           <a:xfrm>
-            <a:off x="167163" y="2043890"/>
-            <a:ext cx="6448276" cy="3906000"/>
+            <a:off x="6615439" y="2043890"/>
+            <a:ext cx="5166001" cy="3906000"/>
           </a:xfrm>
           <a:prstGeom prst="rect">
             <a:avLst/>
@@ -3689,10 +3689,10 @@
       </p:pic>
       <p:pic>
         <p:nvPicPr>
-          <p:cNvPr id="8" name="Picture 7">
-            <a:extLst>
-              <a:ext uri="{FF2B5EF4-FFF2-40B4-BE49-F238E27FC236}">
-                <a16:creationId xmlns:a16="http://schemas.microsoft.com/office/drawing/2014/main" id="{AAC3619A-308F-4FB7-A32F-365ED649EBFC}"/>
+          <p:cNvPr id="3" name="Picture 2">
+            <a:extLst>
+              <a:ext uri="{FF2B5EF4-FFF2-40B4-BE49-F238E27FC236}">
+                <a16:creationId xmlns:a16="http://schemas.microsoft.com/office/drawing/2014/main" id="{A4A17074-2AFD-4FC6-AF0A-8F547671E01C}"/>
               </a:ext>
             </a:extLst>
           </p:cNvPr>
@@ -3709,7 +3709,7 @@
         </p:blipFill>
         <p:spPr>
           <a:xfrm>
-            <a:off x="6615439" y="2043890"/>
+            <a:off x="1077808" y="2043890"/>
             <a:ext cx="5166001" cy="3906000"/>
           </a:xfrm>
           <a:prstGeom prst="rect">
@@ -3895,10 +3895,10 @@
       </p:pic>
       <p:pic>
         <p:nvPicPr>
-          <p:cNvPr id="4" name="Picture 3">
-            <a:extLst>
-              <a:ext uri="{FF2B5EF4-FFF2-40B4-BE49-F238E27FC236}">
-                <a16:creationId xmlns:a16="http://schemas.microsoft.com/office/drawing/2014/main" id="{32D8C6C7-AA65-40FF-99DE-CD68473D60BA}"/>
+          <p:cNvPr id="5" name="Picture 4">
+            <a:extLst>
+              <a:ext uri="{FF2B5EF4-FFF2-40B4-BE49-F238E27FC236}">
+                <a16:creationId xmlns:a16="http://schemas.microsoft.com/office/drawing/2014/main" id="{4B1E1585-F6EC-4BD6-A24B-A9A480E1C104}"/>
               </a:ext>
             </a:extLst>
           </p:cNvPr>
@@ -3915,7 +3915,7 @@
         </p:blipFill>
         <p:spPr>
           <a:xfrm>
-            <a:off x="6096000" y="2072767"/>
+            <a:off x="6265824" y="2072767"/>
             <a:ext cx="5166001" cy="3906000"/>
           </a:xfrm>
           <a:prstGeom prst="rect">
@@ -4013,10 +4013,10 @@
       </p:pic>
       <p:pic>
         <p:nvPicPr>
-          <p:cNvPr id="4" name="Picture 3">
-            <a:extLst>
-              <a:ext uri="{FF2B5EF4-FFF2-40B4-BE49-F238E27FC236}">
-                <a16:creationId xmlns:a16="http://schemas.microsoft.com/office/drawing/2014/main" id="{C4CF9D98-C24C-4AE1-9321-4BD398FE0086}"/>
+          <p:cNvPr id="5" name="Picture 4">
+            <a:extLst>
+              <a:ext uri="{FF2B5EF4-FFF2-40B4-BE49-F238E27FC236}">
+                <a16:creationId xmlns:a16="http://schemas.microsoft.com/office/drawing/2014/main" id="{97834AB2-703E-4809-B637-30C6A462B47E}"/>
               </a:ext>
             </a:extLst>
           </p:cNvPr>
@@ -5287,7 +5287,21 @@
                 <a:latin typeface="Courier New" panose="02070309020205020404" pitchFamily="49" charset="0"/>
                 <a:cs typeface="Courier New" panose="02070309020205020404" pitchFamily="49" charset="0"/>
               </a:rPr>
-              <a:t>   RFS due to GM at Input: 37.0 m/s</a:t>
+              <a:t>   RFS due to GM at Input</a:t>
+            </a:r>
+            <a:r>
+              <a:rPr lang="en-US" sz="1400">
+                <a:latin typeface="Courier New" panose="02070309020205020404" pitchFamily="49" charset="0"/>
+                <a:cs typeface="Courier New" panose="02070309020205020404" pitchFamily="49" charset="0"/>
+              </a:rPr>
+              <a:t>: 34.8 </a:t>
+            </a:r>
+            <a:r>
+              <a:rPr lang="en-US" sz="1400" dirty="0">
+                <a:latin typeface="Courier New" panose="02070309020205020404" pitchFamily="49" charset="0"/>
+                <a:cs typeface="Courier New" panose="02070309020205020404" pitchFamily="49" charset="0"/>
+              </a:rPr>
+              <a:t>m/s</a:t>
             </a:r>
           </a:p>
           <a:p>
@@ -5314,7 +5328,17 @@
                 <a:latin typeface="Courier New" panose="02070309020205020404" pitchFamily="49" charset="0"/>
                 <a:cs typeface="Courier New" panose="02070309020205020404" pitchFamily="49" charset="0"/>
               </a:rPr>
-              <a:t>   RFS due to GM at Multi-Input: 32.5 m/s</a:t>
+              <a:t>   </a:t>
+            </a:r>
+            <a:r>
+              <a:rPr lang="en-US" sz="1400" dirty="0">
+                <a:highlight>
+                  <a:srgbClr val="00FF00"/>
+                </a:highlight>
+                <a:latin typeface="Courier New" panose="02070309020205020404" pitchFamily="49" charset="0"/>
+                <a:cs typeface="Courier New" panose="02070309020205020404" pitchFamily="49" charset="0"/>
+              </a:rPr>
+              <a:t>RFS due to GM at Multi-Input: 32.5 m/s</a:t>
             </a:r>
           </a:p>
         </p:txBody>
@@ -5409,10 +5433,10 @@
       </p:pic>
       <p:pic>
         <p:nvPicPr>
-          <p:cNvPr id="6" name="Picture 5">
-            <a:extLst>
-              <a:ext uri="{FF2B5EF4-FFF2-40B4-BE49-F238E27FC236}">
-                <a16:creationId xmlns:a16="http://schemas.microsoft.com/office/drawing/2014/main" id="{63737282-014B-4A77-B8FA-521D5151EBC2}"/>
+          <p:cNvPr id="3" name="Picture 2">
+            <a:extLst>
+              <a:ext uri="{FF2B5EF4-FFF2-40B4-BE49-F238E27FC236}">
+                <a16:creationId xmlns:a16="http://schemas.microsoft.com/office/drawing/2014/main" id="{4EF089D0-1334-41F5-AAC1-51E0D83EA4E1}"/>
               </a:ext>
             </a:extLst>
           </p:cNvPr>
@@ -5429,8 +5453,8 @@
         </p:blipFill>
         <p:spPr>
           <a:xfrm>
-            <a:off x="6096000" y="1832135"/>
-            <a:ext cx="5166001" cy="3906000"/>
+            <a:off x="6015168" y="1832135"/>
+            <a:ext cx="5147551" cy="3906000"/>
           </a:xfrm>
           <a:prstGeom prst="rect">
             <a:avLst/>
@@ -5527,10 +5551,10 @@
       </p:pic>
       <p:pic>
         <p:nvPicPr>
-          <p:cNvPr id="4" name="Picture 3">
-            <a:extLst>
-              <a:ext uri="{FF2B5EF4-FFF2-40B4-BE49-F238E27FC236}">
-                <a16:creationId xmlns:a16="http://schemas.microsoft.com/office/drawing/2014/main" id="{DDE0DA62-143C-4FD3-8CF0-190FCD10EC7C}"/>
+          <p:cNvPr id="5" name="Picture 4">
+            <a:extLst>
+              <a:ext uri="{FF2B5EF4-FFF2-40B4-BE49-F238E27FC236}">
+                <a16:creationId xmlns:a16="http://schemas.microsoft.com/office/drawing/2014/main" id="{FF2DD742-6C63-4586-AB07-93ED9535EBE2}"/>
               </a:ext>
             </a:extLst>
           </p:cNvPr>
@@ -5547,8 +5571,8 @@
         </p:blipFill>
         <p:spPr>
           <a:xfrm>
-            <a:off x="5059580" y="1986139"/>
-            <a:ext cx="7020226" cy="3906000"/>
+            <a:off x="4665344" y="1986139"/>
+            <a:ext cx="7038676" cy="3906000"/>
           </a:xfrm>
           <a:prstGeom prst="rect">
             <a:avLst/>

</xml_diff>

<commit_message>
updated Robustness/RobustnessAnalysisAP.m to plot gain margins using a linear scale (log scale option still present). Updated RobustnessAnalysis_02142019.pptx to reflect these changes.
</commit_message>
<xml_diff>
--- a/Software/Geri_Model_Package/Robustness/RobustnessAnalysis_02142019.pptx
+++ b/Software/Geri_Model_Package/Robustness/RobustnessAnalysis_02142019.pptx
@@ -6,20 +6,21 @@
   </p:sldMasterIdLst>
   <p:sldIdLst>
     <p:sldId id="256" r:id="rId2"/>
-    <p:sldId id="270" r:id="rId3"/>
-    <p:sldId id="267" r:id="rId4"/>
-    <p:sldId id="268" r:id="rId5"/>
-    <p:sldId id="269" r:id="rId6"/>
-    <p:sldId id="257" r:id="rId7"/>
-    <p:sldId id="258" r:id="rId8"/>
-    <p:sldId id="261" r:id="rId9"/>
-    <p:sldId id="262" r:id="rId10"/>
-    <p:sldId id="259" r:id="rId11"/>
-    <p:sldId id="263" r:id="rId12"/>
-    <p:sldId id="264" r:id="rId13"/>
-    <p:sldId id="260" r:id="rId14"/>
-    <p:sldId id="265" r:id="rId15"/>
-    <p:sldId id="266" r:id="rId16"/>
+    <p:sldId id="271" r:id="rId3"/>
+    <p:sldId id="270" r:id="rId4"/>
+    <p:sldId id="267" r:id="rId5"/>
+    <p:sldId id="268" r:id="rId6"/>
+    <p:sldId id="269" r:id="rId7"/>
+    <p:sldId id="257" r:id="rId8"/>
+    <p:sldId id="258" r:id="rId9"/>
+    <p:sldId id="261" r:id="rId10"/>
+    <p:sldId id="262" r:id="rId11"/>
+    <p:sldId id="259" r:id="rId12"/>
+    <p:sldId id="263" r:id="rId13"/>
+    <p:sldId id="264" r:id="rId14"/>
+    <p:sldId id="260" r:id="rId15"/>
+    <p:sldId id="265" r:id="rId16"/>
+    <p:sldId id="266" r:id="rId17"/>
   </p:sldIdLst>
   <p:sldSz cx="12192000" cy="6858000"/>
   <p:notesSz cx="6858000" cy="9144000"/>
@@ -273,7 +274,7 @@
           <a:p>
             <a:fld id="{FCE4FD93-E6F5-4F39-9C9D-0016CD56957B}" type="datetimeFigureOut">
               <a:rPr lang="en-US" smtClean="0"/>
-              <a:t>2/17/2019</a:t>
+              <a:t>2/18/2019</a:t>
             </a:fld>
             <a:endParaRPr lang="en-US"/>
           </a:p>
@@ -471,7 +472,7 @@
           <a:p>
             <a:fld id="{FCE4FD93-E6F5-4F39-9C9D-0016CD56957B}" type="datetimeFigureOut">
               <a:rPr lang="en-US" smtClean="0"/>
-              <a:t>2/17/2019</a:t>
+              <a:t>2/18/2019</a:t>
             </a:fld>
             <a:endParaRPr lang="en-US"/>
           </a:p>
@@ -679,7 +680,7 @@
           <a:p>
             <a:fld id="{FCE4FD93-E6F5-4F39-9C9D-0016CD56957B}" type="datetimeFigureOut">
               <a:rPr lang="en-US" smtClean="0"/>
-              <a:t>2/17/2019</a:t>
+              <a:t>2/18/2019</a:t>
             </a:fld>
             <a:endParaRPr lang="en-US"/>
           </a:p>
@@ -877,7 +878,7 @@
           <a:p>
             <a:fld id="{FCE4FD93-E6F5-4F39-9C9D-0016CD56957B}" type="datetimeFigureOut">
               <a:rPr lang="en-US" smtClean="0"/>
-              <a:t>2/17/2019</a:t>
+              <a:t>2/18/2019</a:t>
             </a:fld>
             <a:endParaRPr lang="en-US"/>
           </a:p>
@@ -1152,7 +1153,7 @@
           <a:p>
             <a:fld id="{FCE4FD93-E6F5-4F39-9C9D-0016CD56957B}" type="datetimeFigureOut">
               <a:rPr lang="en-US" smtClean="0"/>
-              <a:t>2/17/2019</a:t>
+              <a:t>2/18/2019</a:t>
             </a:fld>
             <a:endParaRPr lang="en-US"/>
           </a:p>
@@ -1417,7 +1418,7 @@
           <a:p>
             <a:fld id="{FCE4FD93-E6F5-4F39-9C9D-0016CD56957B}" type="datetimeFigureOut">
               <a:rPr lang="en-US" smtClean="0"/>
-              <a:t>2/17/2019</a:t>
+              <a:t>2/18/2019</a:t>
             </a:fld>
             <a:endParaRPr lang="en-US"/>
           </a:p>
@@ -1829,7 +1830,7 @@
           <a:p>
             <a:fld id="{FCE4FD93-E6F5-4F39-9C9D-0016CD56957B}" type="datetimeFigureOut">
               <a:rPr lang="en-US" smtClean="0"/>
-              <a:t>2/17/2019</a:t>
+              <a:t>2/18/2019</a:t>
             </a:fld>
             <a:endParaRPr lang="en-US"/>
           </a:p>
@@ -1970,7 +1971,7 @@
           <a:p>
             <a:fld id="{FCE4FD93-E6F5-4F39-9C9D-0016CD56957B}" type="datetimeFigureOut">
               <a:rPr lang="en-US" smtClean="0"/>
-              <a:t>2/17/2019</a:t>
+              <a:t>2/18/2019</a:t>
             </a:fld>
             <a:endParaRPr lang="en-US"/>
           </a:p>
@@ -2083,7 +2084,7 @@
           <a:p>
             <a:fld id="{FCE4FD93-E6F5-4F39-9C9D-0016CD56957B}" type="datetimeFigureOut">
               <a:rPr lang="en-US" smtClean="0"/>
-              <a:t>2/17/2019</a:t>
+              <a:t>2/18/2019</a:t>
             </a:fld>
             <a:endParaRPr lang="en-US"/>
           </a:p>
@@ -2394,7 +2395,7 @@
           <a:p>
             <a:fld id="{FCE4FD93-E6F5-4F39-9C9D-0016CD56957B}" type="datetimeFigureOut">
               <a:rPr lang="en-US" smtClean="0"/>
-              <a:t>2/17/2019</a:t>
+              <a:t>2/18/2019</a:t>
             </a:fld>
             <a:endParaRPr lang="en-US"/>
           </a:p>
@@ -2682,7 +2683,7 @@
           <a:p>
             <a:fld id="{FCE4FD93-E6F5-4F39-9C9D-0016CD56957B}" type="datetimeFigureOut">
               <a:rPr lang="en-US" smtClean="0"/>
-              <a:t>2/17/2019</a:t>
+              <a:t>2/18/2019</a:t>
             </a:fld>
             <a:endParaRPr lang="en-US"/>
           </a:p>
@@ -2923,7 +2924,7 @@
           <a:p>
             <a:fld id="{FCE4FD93-E6F5-4F39-9C9D-0016CD56957B}" type="datetimeFigureOut">
               <a:rPr lang="en-US" smtClean="0"/>
-              <a:t>2/17/2019</a:t>
+              <a:t>2/18/2019</a:t>
             </a:fld>
             <a:endParaRPr lang="en-US"/>
           </a:p>
@@ -3426,14 +3427,30 @@
             <a:pPr lvl="1"/>
             <a:r>
               <a:rPr lang="en-US" dirty="0"/>
-              <a:t>Threshold criteria: 6 dB GM, 45</a:t>
-            </a:r>
-            <a:r>
-              <a:rPr lang="en-US" baseline="30000" dirty="0"/>
+              <a:t>Threshold criteria: </a:t>
+            </a:r>
+            <a:r>
+              <a:rPr lang="en-US" dirty="0">
+                <a:highlight>
+                  <a:srgbClr val="FFFF00"/>
+                </a:highlight>
+              </a:rPr>
+              <a:t>6 dB GM, 45</a:t>
+            </a:r>
+            <a:r>
+              <a:rPr lang="en-US" baseline="30000" dirty="0">
+                <a:highlight>
+                  <a:srgbClr val="FFFF00"/>
+                </a:highlight>
+              </a:rPr>
               <a:t>o</a:t>
             </a:r>
             <a:r>
-              <a:rPr lang="en-US" dirty="0"/>
+              <a:rPr lang="en-US" dirty="0">
+                <a:highlight>
+                  <a:srgbClr val="FFFF00"/>
+                </a:highlight>
+              </a:rPr>
               <a:t> PM</a:t>
             </a:r>
           </a:p>
@@ -3454,7 +3471,7 @@
             </a:r>
             <a:r>
               <a:rPr lang="en-US" dirty="0"/>
-              <a:t> (2/14/2019)</a:t>
+              <a:t> (2/18/2019)</a:t>
             </a:r>
           </a:p>
           <a:p>
@@ -3534,17 +3551,17 @@
           <a:p>
             <a:r>
               <a:rPr lang="en-US" dirty="0"/>
-              <a:t>MIDAAS – Robustness Margins Results</a:t>
+              <a:t>HINF – Robustness Margins Results</a:t>
             </a:r>
           </a:p>
         </p:txBody>
       </p:sp>
       <p:pic>
         <p:nvPicPr>
-          <p:cNvPr id="6" name="Picture 5">
-            <a:extLst>
-              <a:ext uri="{FF2B5EF4-FFF2-40B4-BE49-F238E27FC236}">
-                <a16:creationId xmlns:a16="http://schemas.microsoft.com/office/drawing/2014/main" id="{C8521E1A-ED9E-49F4-BBAD-8C550E42BF54}"/>
+          <p:cNvPr id="4" name="Picture 3">
+            <a:extLst>
+              <a:ext uri="{FF2B5EF4-FFF2-40B4-BE49-F238E27FC236}">
+                <a16:creationId xmlns:a16="http://schemas.microsoft.com/office/drawing/2014/main" id="{D5C7D57C-3740-4294-99AF-38E9B05A2DD9}"/>
               </a:ext>
             </a:extLst>
           </p:cNvPr>
@@ -3561,37 +3578,7 @@
         </p:blipFill>
         <p:spPr>
           <a:xfrm>
-            <a:off x="490667" y="1947638"/>
-            <a:ext cx="5166001" cy="3906000"/>
-          </a:xfrm>
-          <a:prstGeom prst="rect">
-            <a:avLst/>
-          </a:prstGeom>
-        </p:spPr>
-      </p:pic>
-      <p:pic>
-        <p:nvPicPr>
-          <p:cNvPr id="3" name="Picture 2">
-            <a:extLst>
-              <a:ext uri="{FF2B5EF4-FFF2-40B4-BE49-F238E27FC236}">
-                <a16:creationId xmlns:a16="http://schemas.microsoft.com/office/drawing/2014/main" id="{EB0BC003-859C-4847-8285-8503FD47CA8E}"/>
-              </a:ext>
-            </a:extLst>
-          </p:cNvPr>
-          <p:cNvPicPr>
-            <a:picLocks noChangeAspect="1"/>
-          </p:cNvPicPr>
-          <p:nvPr/>
-        </p:nvPicPr>
-        <p:blipFill>
-          <a:blip r:embed="rId3"/>
-          <a:stretch>
-            <a:fillRect/>
-          </a:stretch>
-        </p:blipFill>
-        <p:spPr>
-          <a:xfrm>
-            <a:off x="6313950" y="1947638"/>
+            <a:off x="2945108" y="1957263"/>
             <a:ext cx="5166001" cy="3906000"/>
           </a:xfrm>
           <a:prstGeom prst="rect">
@@ -3602,7 +3589,7 @@
     </p:spTree>
     <p:extLst>
       <p:ext uri="{BB962C8B-B14F-4D97-AF65-F5344CB8AC3E}">
-        <p14:creationId xmlns:p14="http://schemas.microsoft.com/office/powerpoint/2010/main" val="2004896307"/>
+        <p14:creationId xmlns:p14="http://schemas.microsoft.com/office/powerpoint/2010/main" val="2422622659"/>
       </p:ext>
     </p:extLst>
   </p:cSld>
@@ -3659,10 +3646,10 @@
       </p:sp>
       <p:pic>
         <p:nvPicPr>
-          <p:cNvPr id="8" name="Picture 7">
-            <a:extLst>
-              <a:ext uri="{FF2B5EF4-FFF2-40B4-BE49-F238E27FC236}">
-                <a16:creationId xmlns:a16="http://schemas.microsoft.com/office/drawing/2014/main" id="{AAC3619A-308F-4FB7-A32F-365ED649EBFC}"/>
+          <p:cNvPr id="6" name="Picture 5">
+            <a:extLst>
+              <a:ext uri="{FF2B5EF4-FFF2-40B4-BE49-F238E27FC236}">
+                <a16:creationId xmlns:a16="http://schemas.microsoft.com/office/drawing/2014/main" id="{C8521E1A-ED9E-49F4-BBAD-8C550E42BF54}"/>
               </a:ext>
             </a:extLst>
           </p:cNvPr>
@@ -3679,7 +3666,7 @@
         </p:blipFill>
         <p:spPr>
           <a:xfrm>
-            <a:off x="6615439" y="2043890"/>
+            <a:off x="490667" y="1947638"/>
             <a:ext cx="5166001" cy="3906000"/>
           </a:xfrm>
           <a:prstGeom prst="rect">
@@ -3689,10 +3676,10 @@
       </p:pic>
       <p:pic>
         <p:nvPicPr>
-          <p:cNvPr id="3" name="Picture 2">
-            <a:extLst>
-              <a:ext uri="{FF2B5EF4-FFF2-40B4-BE49-F238E27FC236}">
-                <a16:creationId xmlns:a16="http://schemas.microsoft.com/office/drawing/2014/main" id="{A4A17074-2AFD-4FC6-AF0A-8F547671E01C}"/>
+          <p:cNvPr id="5" name="Picture 4">
+            <a:extLst>
+              <a:ext uri="{FF2B5EF4-FFF2-40B4-BE49-F238E27FC236}">
+                <a16:creationId xmlns:a16="http://schemas.microsoft.com/office/drawing/2014/main" id="{EEEC07B2-79E1-4B62-A4AD-8B5CAFC862BF}"/>
               </a:ext>
             </a:extLst>
           </p:cNvPr>
@@ -3709,8 +3696,8 @@
         </p:blipFill>
         <p:spPr>
           <a:xfrm>
-            <a:off x="1077808" y="2043890"/>
-            <a:ext cx="5166001" cy="3906000"/>
+            <a:off x="5059332" y="1947638"/>
+            <a:ext cx="6642001" cy="3906000"/>
           </a:xfrm>
           <a:prstGeom prst="rect">
             <a:avLst/>
@@ -3720,7 +3707,7 @@
     </p:spTree>
     <p:extLst>
       <p:ext uri="{BB962C8B-B14F-4D97-AF65-F5344CB8AC3E}">
-        <p14:creationId xmlns:p14="http://schemas.microsoft.com/office/powerpoint/2010/main" val="4238263848"/>
+        <p14:creationId xmlns:p14="http://schemas.microsoft.com/office/powerpoint/2010/main" val="2004896307"/>
       </p:ext>
     </p:extLst>
   </p:cSld>
@@ -3777,10 +3764,10 @@
       </p:sp>
       <p:pic>
         <p:nvPicPr>
-          <p:cNvPr id="4" name="Picture 3">
-            <a:extLst>
-              <a:ext uri="{FF2B5EF4-FFF2-40B4-BE49-F238E27FC236}">
-                <a16:creationId xmlns:a16="http://schemas.microsoft.com/office/drawing/2014/main" id="{FC7D086E-6763-4851-A32A-F423AD61FC24}"/>
+          <p:cNvPr id="8" name="Picture 7">
+            <a:extLst>
+              <a:ext uri="{FF2B5EF4-FFF2-40B4-BE49-F238E27FC236}">
+                <a16:creationId xmlns:a16="http://schemas.microsoft.com/office/drawing/2014/main" id="{AAC3619A-308F-4FB7-A32F-365ED649EBFC}"/>
               </a:ext>
             </a:extLst>
           </p:cNvPr>
@@ -3797,8 +3784,38 @@
         </p:blipFill>
         <p:spPr>
           <a:xfrm>
-            <a:off x="3368621" y="2015015"/>
+            <a:off x="253140" y="1861010"/>
             <a:ext cx="5166001" cy="3906000"/>
+          </a:xfrm>
+          <a:prstGeom prst="rect">
+            <a:avLst/>
+          </a:prstGeom>
+        </p:spPr>
+      </p:pic>
+      <p:pic>
+        <p:nvPicPr>
+          <p:cNvPr id="5" name="Picture 4">
+            <a:extLst>
+              <a:ext uri="{FF2B5EF4-FFF2-40B4-BE49-F238E27FC236}">
+                <a16:creationId xmlns:a16="http://schemas.microsoft.com/office/drawing/2014/main" id="{5BECE47D-E20F-4E52-BDEB-A40B288B443E}"/>
+              </a:ext>
+            </a:extLst>
+          </p:cNvPr>
+          <p:cNvPicPr>
+            <a:picLocks noChangeAspect="1"/>
+          </p:cNvPicPr>
+          <p:nvPr/>
+        </p:nvPicPr>
+        <p:blipFill>
+          <a:blip r:embed="rId3"/>
+          <a:stretch>
+            <a:fillRect/>
+          </a:stretch>
+        </p:blipFill>
+        <p:spPr>
+          <a:xfrm>
+            <a:off x="4931458" y="1861010"/>
+            <a:ext cx="6660451" cy="3906000"/>
           </a:xfrm>
           <a:prstGeom prst="rect">
             <a:avLst/>
@@ -3808,7 +3825,7 @@
     </p:spTree>
     <p:extLst>
       <p:ext uri="{BB962C8B-B14F-4D97-AF65-F5344CB8AC3E}">
-        <p14:creationId xmlns:p14="http://schemas.microsoft.com/office/powerpoint/2010/main" val="4145927941"/>
+        <p14:creationId xmlns:p14="http://schemas.microsoft.com/office/powerpoint/2010/main" val="4238263848"/>
       </p:ext>
     </p:extLst>
   </p:cSld>
@@ -3858,17 +3875,17 @@
           <a:p>
             <a:r>
               <a:rPr lang="en-US" dirty="0"/>
-              <a:t>ILAF – Robustness Margins Results</a:t>
+              <a:t>MIDAAS – Robustness Margins Results</a:t>
             </a:r>
           </a:p>
         </p:txBody>
       </p:sp>
       <p:pic>
         <p:nvPicPr>
-          <p:cNvPr id="3" name="Picture 2">
-            <a:extLst>
-              <a:ext uri="{FF2B5EF4-FFF2-40B4-BE49-F238E27FC236}">
-                <a16:creationId xmlns:a16="http://schemas.microsoft.com/office/drawing/2014/main" id="{E7FBAA03-5539-4EB1-AFE8-CBD649180EF6}"/>
+          <p:cNvPr id="5" name="Picture 4">
+            <a:extLst>
+              <a:ext uri="{FF2B5EF4-FFF2-40B4-BE49-F238E27FC236}">
+                <a16:creationId xmlns:a16="http://schemas.microsoft.com/office/drawing/2014/main" id="{3882E3EC-51B9-443E-AE3A-D40DBB4F2061}"/>
               </a:ext>
             </a:extLst>
           </p:cNvPr>
@@ -3885,37 +3902,7 @@
         </p:blipFill>
         <p:spPr>
           <a:xfrm>
-            <a:off x="663921" y="2072767"/>
-            <a:ext cx="5166001" cy="3906000"/>
-          </a:xfrm>
-          <a:prstGeom prst="rect">
-            <a:avLst/>
-          </a:prstGeom>
-        </p:spPr>
-      </p:pic>
-      <p:pic>
-        <p:nvPicPr>
-          <p:cNvPr id="5" name="Picture 4">
-            <a:extLst>
-              <a:ext uri="{FF2B5EF4-FFF2-40B4-BE49-F238E27FC236}">
-                <a16:creationId xmlns:a16="http://schemas.microsoft.com/office/drawing/2014/main" id="{4B1E1585-F6EC-4BD6-A24B-A9A480E1C104}"/>
-              </a:ext>
-            </a:extLst>
-          </p:cNvPr>
-          <p:cNvPicPr>
-            <a:picLocks noChangeAspect="1"/>
-          </p:cNvPicPr>
-          <p:nvPr/>
-        </p:nvPicPr>
-        <p:blipFill>
-          <a:blip r:embed="rId3"/>
-          <a:stretch>
-            <a:fillRect/>
-          </a:stretch>
-        </p:blipFill>
-        <p:spPr>
-          <a:xfrm>
-            <a:off x="6265824" y="2072767"/>
+            <a:off x="3099113" y="2092017"/>
             <a:ext cx="5166001" cy="3906000"/>
           </a:xfrm>
           <a:prstGeom prst="rect">
@@ -3926,7 +3913,7 @@
     </p:spTree>
     <p:extLst>
       <p:ext uri="{BB962C8B-B14F-4D97-AF65-F5344CB8AC3E}">
-        <p14:creationId xmlns:p14="http://schemas.microsoft.com/office/powerpoint/2010/main" val="1636440539"/>
+        <p14:creationId xmlns:p14="http://schemas.microsoft.com/office/powerpoint/2010/main" val="4145927941"/>
       </p:ext>
     </p:extLst>
   </p:cSld>
@@ -3986,7 +3973,7 @@
           <p:cNvPr id="3" name="Picture 2">
             <a:extLst>
               <a:ext uri="{FF2B5EF4-FFF2-40B4-BE49-F238E27FC236}">
-                <a16:creationId xmlns:a16="http://schemas.microsoft.com/office/drawing/2014/main" id="{6190ECCD-F8D8-4A92-8BBC-0249C115F2FF}"/>
+                <a16:creationId xmlns:a16="http://schemas.microsoft.com/office/drawing/2014/main" id="{E7FBAA03-5539-4EB1-AFE8-CBD649180EF6}"/>
               </a:ext>
             </a:extLst>
           </p:cNvPr>
@@ -4003,7 +3990,7 @@
         </p:blipFill>
         <p:spPr>
           <a:xfrm>
-            <a:off x="929999" y="1995764"/>
+            <a:off x="663921" y="2072767"/>
             <a:ext cx="5166001" cy="3906000"/>
           </a:xfrm>
           <a:prstGeom prst="rect">
@@ -4013,10 +4000,10 @@
       </p:pic>
       <p:pic>
         <p:nvPicPr>
-          <p:cNvPr id="5" name="Picture 4">
-            <a:extLst>
-              <a:ext uri="{FF2B5EF4-FFF2-40B4-BE49-F238E27FC236}">
-                <a16:creationId xmlns:a16="http://schemas.microsoft.com/office/drawing/2014/main" id="{97834AB2-703E-4809-B637-30C6A462B47E}"/>
+          <p:cNvPr id="6" name="Picture 5">
+            <a:extLst>
+              <a:ext uri="{FF2B5EF4-FFF2-40B4-BE49-F238E27FC236}">
+                <a16:creationId xmlns:a16="http://schemas.microsoft.com/office/drawing/2014/main" id="{69B6FF46-8C4D-4739-90E0-6D8E6CCF0ABC}"/>
               </a:ext>
             </a:extLst>
           </p:cNvPr>
@@ -4033,7 +4020,7 @@
         </p:blipFill>
         <p:spPr>
           <a:xfrm>
-            <a:off x="6400578" y="1995764"/>
+            <a:off x="5829922" y="2072767"/>
             <a:ext cx="5166001" cy="3906000"/>
           </a:xfrm>
           <a:prstGeom prst="rect">
@@ -4044,7 +4031,7 @@
     </p:spTree>
     <p:extLst>
       <p:ext uri="{BB962C8B-B14F-4D97-AF65-F5344CB8AC3E}">
-        <p14:creationId xmlns:p14="http://schemas.microsoft.com/office/powerpoint/2010/main" val="3206741681"/>
+        <p14:creationId xmlns:p14="http://schemas.microsoft.com/office/powerpoint/2010/main" val="1636440539"/>
       </p:ext>
     </p:extLst>
   </p:cSld>
@@ -4104,7 +4091,7 @@
           <p:cNvPr id="3" name="Picture 2">
             <a:extLst>
               <a:ext uri="{FF2B5EF4-FFF2-40B4-BE49-F238E27FC236}">
-                <a16:creationId xmlns:a16="http://schemas.microsoft.com/office/drawing/2014/main" id="{A5AAD6E2-895A-4741-9872-4739623D2FC8}"/>
+                <a16:creationId xmlns:a16="http://schemas.microsoft.com/office/drawing/2014/main" id="{6190ECCD-F8D8-4A92-8BBC-0249C115F2FF}"/>
               </a:ext>
             </a:extLst>
           </p:cNvPr>
@@ -4121,7 +4108,125 @@
         </p:blipFill>
         <p:spPr>
           <a:xfrm>
-            <a:off x="3358995" y="1784008"/>
+            <a:off x="929999" y="1995764"/>
+            <a:ext cx="5166001" cy="3906000"/>
+          </a:xfrm>
+          <a:prstGeom prst="rect">
+            <a:avLst/>
+          </a:prstGeom>
+        </p:spPr>
+      </p:pic>
+      <p:pic>
+        <p:nvPicPr>
+          <p:cNvPr id="6" name="Picture 5">
+            <a:extLst>
+              <a:ext uri="{FF2B5EF4-FFF2-40B4-BE49-F238E27FC236}">
+                <a16:creationId xmlns:a16="http://schemas.microsoft.com/office/drawing/2014/main" id="{E374EA53-030C-4B16-916F-3B77D3660E82}"/>
+              </a:ext>
+            </a:extLst>
+          </p:cNvPr>
+          <p:cNvPicPr>
+            <a:picLocks noChangeAspect="1"/>
+          </p:cNvPicPr>
+          <p:nvPr/>
+        </p:nvPicPr>
+        <p:blipFill>
+          <a:blip r:embed="rId3"/>
+          <a:stretch>
+            <a:fillRect/>
+          </a:stretch>
+        </p:blipFill>
+        <p:spPr>
+          <a:xfrm>
+            <a:off x="6256199" y="1995764"/>
+            <a:ext cx="5166001" cy="3906000"/>
+          </a:xfrm>
+          <a:prstGeom prst="rect">
+            <a:avLst/>
+          </a:prstGeom>
+        </p:spPr>
+      </p:pic>
+    </p:spTree>
+    <p:extLst>
+      <p:ext uri="{BB962C8B-B14F-4D97-AF65-F5344CB8AC3E}">
+        <p14:creationId xmlns:p14="http://schemas.microsoft.com/office/powerpoint/2010/main" val="3206741681"/>
+      </p:ext>
+    </p:extLst>
+  </p:cSld>
+  <p:clrMapOvr>
+    <a:masterClrMapping/>
+  </p:clrMapOvr>
+</p:sld>
+</file>
+
+<file path=ppt/slides/slide16.xml><?xml version="1.0" encoding="utf-8"?>
+<p:sld xmlns:a="http://schemas.openxmlformats.org/drawingml/2006/main" xmlns:r="http://schemas.openxmlformats.org/officeDocument/2006/relationships" xmlns:p="http://schemas.openxmlformats.org/presentationml/2006/main">
+  <p:cSld>
+    <p:spTree>
+      <p:nvGrpSpPr>
+        <p:cNvPr id="1" name=""/>
+        <p:cNvGrpSpPr/>
+        <p:nvPr/>
+      </p:nvGrpSpPr>
+      <p:grpSpPr>
+        <a:xfrm>
+          <a:off x="0" y="0"/>
+          <a:ext cx="0" cy="0"/>
+          <a:chOff x="0" y="0"/>
+          <a:chExt cx="0" cy="0"/>
+        </a:xfrm>
+      </p:grpSpPr>
+      <p:sp>
+        <p:nvSpPr>
+          <p:cNvPr id="2" name="Title 1">
+            <a:extLst>
+              <a:ext uri="{FF2B5EF4-FFF2-40B4-BE49-F238E27FC236}">
+                <a16:creationId xmlns:a16="http://schemas.microsoft.com/office/drawing/2014/main" id="{7149377C-658B-4730-B8EA-C2EEE8041CBF}"/>
+              </a:ext>
+            </a:extLst>
+          </p:cNvPr>
+          <p:cNvSpPr>
+            <a:spLocks noGrp="1"/>
+          </p:cNvSpPr>
+          <p:nvPr>
+            <p:ph type="title"/>
+          </p:nvPr>
+        </p:nvSpPr>
+        <p:spPr/>
+        <p:txBody>
+          <a:bodyPr/>
+          <a:lstStyle/>
+          <a:p>
+            <a:r>
+              <a:rPr lang="en-US" dirty="0"/>
+              <a:t>ILAF – Robustness Margins Results</a:t>
+            </a:r>
+          </a:p>
+        </p:txBody>
+      </p:sp>
+      <p:pic>
+        <p:nvPicPr>
+          <p:cNvPr id="5" name="Picture 4">
+            <a:extLst>
+              <a:ext uri="{FF2B5EF4-FFF2-40B4-BE49-F238E27FC236}">
+                <a16:creationId xmlns:a16="http://schemas.microsoft.com/office/drawing/2014/main" id="{CE9A899F-9366-4AB8-A324-9ACEF9F547C7}"/>
+              </a:ext>
+            </a:extLst>
+          </p:cNvPr>
+          <p:cNvPicPr>
+            <a:picLocks noChangeAspect="1"/>
+          </p:cNvPicPr>
+          <p:nvPr/>
+        </p:nvPicPr>
+        <p:blipFill>
+          <a:blip r:embed="rId2"/>
+          <a:stretch>
+            <a:fillRect/>
+          </a:stretch>
+        </p:blipFill>
+        <p:spPr>
+          <a:xfrm>
+            <a:off x="2877732" y="2236396"/>
             <a:ext cx="5166001" cy="3906000"/>
           </a:xfrm>
           <a:prstGeom prst="rect">
@@ -4164,7 +4269,7 @@
           <p:cNvPr id="2" name="Title 1">
             <a:extLst>
               <a:ext uri="{FF2B5EF4-FFF2-40B4-BE49-F238E27FC236}">
-                <a16:creationId xmlns:a16="http://schemas.microsoft.com/office/drawing/2014/main" id="{0FE5EFA7-34DC-4D49-9D19-66FEB5B1A4DC}"/>
+                <a16:creationId xmlns:a16="http://schemas.microsoft.com/office/drawing/2014/main" id="{0EE0008F-B5EF-45A9-B4D0-9929AFF37C3C}"/>
               </a:ext>
             </a:extLst>
           </p:cNvPr>
@@ -4182,7 +4287,7 @@
           <a:p>
             <a:r>
               <a:rPr lang="en-US" dirty="0"/>
-              <a:t>SAS and Autopilots - description</a:t>
+              <a:t>Defining Robust Flutter Speed</a:t>
             </a:r>
           </a:p>
         </p:txBody>
@@ -4192,7 +4297,7 @@
           <p:cNvPr id="3" name="Content Placeholder 2">
             <a:extLst>
               <a:ext uri="{FF2B5EF4-FFF2-40B4-BE49-F238E27FC236}">
-                <a16:creationId xmlns:a16="http://schemas.microsoft.com/office/drawing/2014/main" id="{80383E03-0416-4112-A8F3-731AD8758C57}"/>
+                <a16:creationId xmlns:a16="http://schemas.microsoft.com/office/drawing/2014/main" id="{C0D15F9C-1BCA-453A-93FB-712A0B280EFB}"/>
               </a:ext>
             </a:extLst>
           </p:cNvPr>
@@ -4203,118 +4308,104 @@
             <p:ph idx="1"/>
           </p:nvPr>
         </p:nvSpPr>
-        <p:spPr/>
+        <p:spPr>
+          <a:xfrm>
+            <a:off x="838200" y="1953927"/>
+            <a:ext cx="4763703" cy="4538947"/>
+          </a:xfrm>
+        </p:spPr>
         <p:txBody>
           <a:bodyPr>
-            <a:normAutofit fontScale="70000" lnSpcReduction="20000"/>
+            <a:normAutofit/>
           </a:bodyPr>
           <a:lstStyle/>
           <a:p>
             <a:r>
               <a:rPr lang="en-US" dirty="0"/>
-              <a:t>Roll Damper</a:t>
-            </a:r>
-          </a:p>
-          <a:p>
-            <a:pPr lvl="1"/>
-            <a:r>
-              <a:rPr lang="en-US" dirty="0"/>
-              <a:t>Gain</a:t>
-            </a:r>
-          </a:p>
-          <a:p>
-            <a:pPr lvl="1"/>
-            <a:r>
-              <a:rPr lang="en-US" dirty="0"/>
-              <a:t>p to aileron</a:t>
-            </a:r>
-          </a:p>
-          <a:p>
-            <a:r>
-              <a:rPr lang="en-US" dirty="0"/>
-              <a:t>Pitch Controller (pitch attitude command)</a:t>
-            </a:r>
-          </a:p>
-          <a:p>
-            <a:pPr lvl="1"/>
-            <a:r>
-              <a:rPr lang="en-US" dirty="0"/>
-              <a:t>PI</a:t>
-            </a:r>
-          </a:p>
-          <a:p>
-            <a:pPr lvl="1"/>
-            <a:r>
-              <a:rPr lang="en-US" dirty="0"/>
-              <a:t>Theta error to elevator</a:t>
-            </a:r>
-          </a:p>
-          <a:p>
-            <a:r>
-              <a:rPr lang="en-US" dirty="0"/>
-              <a:t>Roll Controller (roll attitude command)</a:t>
-            </a:r>
-          </a:p>
-          <a:p>
-            <a:pPr lvl="1"/>
-            <a:r>
-              <a:rPr lang="en-US" dirty="0"/>
-              <a:t>PI</a:t>
-            </a:r>
-          </a:p>
-          <a:p>
-            <a:pPr lvl="1"/>
-            <a:r>
-              <a:rPr lang="en-US" dirty="0"/>
-              <a:t>phi error to elevator</a:t>
-            </a:r>
-          </a:p>
-          <a:p>
-            <a:r>
-              <a:rPr lang="en-US" dirty="0"/>
-              <a:t>Auto throttle (speed command)</a:t>
-            </a:r>
-          </a:p>
-          <a:p>
-            <a:pPr lvl="1"/>
-            <a:r>
-              <a:rPr lang="en-US" dirty="0"/>
-              <a:t>PI</a:t>
-            </a:r>
-          </a:p>
-          <a:p>
-            <a:pPr lvl="1"/>
-            <a:r>
-              <a:rPr lang="en-US" dirty="0"/>
-              <a:t>u error to thrust</a:t>
-            </a:r>
-          </a:p>
-          <a:p>
-            <a:r>
-              <a:rPr lang="en-US" dirty="0"/>
-              <a:t>Altitude hold</a:t>
-            </a:r>
-          </a:p>
-          <a:p>
-            <a:pPr lvl="1"/>
-            <a:r>
-              <a:rPr lang="en-US" dirty="0"/>
-              <a:t>Gain</a:t>
-            </a:r>
-          </a:p>
-          <a:p>
-            <a:pPr lvl="1"/>
-            <a:r>
-              <a:rPr lang="en-US" dirty="0"/>
-              <a:t>h error to theta command (pitch controller input) </a:t>
-            </a:r>
-          </a:p>
-        </p:txBody>
-      </p:sp>
+              <a:t>The speed at which a defined robustness margin is violated.</a:t>
+            </a:r>
+          </a:p>
+          <a:p>
+            <a:r>
+              <a:rPr lang="en-US" dirty="0"/>
+              <a:t>We are using the classical gain and phase margins for each individual loop at both inputs and outputs.</a:t>
+            </a:r>
+          </a:p>
+          <a:p>
+            <a:r>
+              <a:rPr lang="en-US" dirty="0"/>
+              <a:t>A different margin could be defined and the analysis would be the same.</a:t>
+            </a:r>
+          </a:p>
+        </p:txBody>
+      </p:sp>
+      <p:pic>
+        <p:nvPicPr>
+          <p:cNvPr id="5" name="Picture 2">
+            <a:extLst>
+              <a:ext uri="{FF2B5EF4-FFF2-40B4-BE49-F238E27FC236}">
+                <a16:creationId xmlns:a16="http://schemas.microsoft.com/office/drawing/2014/main" id="{55B42682-95BA-4EBB-A9FE-9A2520EC9F21}"/>
+              </a:ext>
+            </a:extLst>
+          </p:cNvPr>
+          <p:cNvPicPr>
+            <a:picLocks noChangeAspect="1" noChangeArrowheads="1"/>
+          </p:cNvPicPr>
+          <p:nvPr/>
+        </p:nvPicPr>
+        <p:blipFill rotWithShape="1">
+          <a:blip r:embed="rId2" cstate="print">
+            <a:extLst>
+              <a:ext uri="{28A0092B-C50C-407E-A947-70E740481C1C}">
+                <a14:useLocalDpi xmlns:a14="http://schemas.microsoft.com/office/drawing/2010/main" val="0"/>
+              </a:ext>
+            </a:extLst>
+          </a:blip>
+          <a:srcRect l="1800"/>
+          <a:stretch/>
+        </p:blipFill>
+        <p:spPr bwMode="auto">
+          <a:xfrm>
+            <a:off x="5849509" y="1953927"/>
+            <a:ext cx="5970805" cy="4269352"/>
+          </a:xfrm>
+          <a:prstGeom prst="rect">
+            <a:avLst/>
+          </a:prstGeom>
+          <a:noFill/>
+          <a:ln w="9525">
+            <a:solidFill>
+              <a:schemeClr val="tx1"/>
+            </a:solidFill>
+            <a:miter lim="800000"/>
+            <a:headEnd/>
+            <a:tailEnd/>
+          </a:ln>
+          <a:effectLst/>
+          <a:extLst>
+            <a:ext uri="{909E8E84-426E-40dd-AFC4-6F175D3DCCD1}">
+              <a14:hiddenFill xmlns:a14="http://schemas.microsoft.com/office/drawing/2010/main" xmlns="">
+                <a:solidFill>
+                  <a:schemeClr val="accent1"/>
+                </a:solidFill>
+              </a14:hiddenFill>
+            </a:ext>
+            <a:ext uri="{AF507438-7753-43e0-B8FC-AC1667EBCBE1}">
+              <a14:hiddenEffects xmlns:a14="http://schemas.microsoft.com/office/drawing/2010/main" xmlns="">
+                <a:effectLst>
+                  <a:outerShdw dist="35921" dir="2700000" algn="ctr" rotWithShape="0">
+                    <a:schemeClr val="bg2"/>
+                  </a:outerShdw>
+                </a:effectLst>
+              </a14:hiddenEffects>
+            </a:ext>
+          </a:extLst>
+        </p:spPr>
+      </p:pic>
     </p:spTree>
     <p:extLst>
       <p:ext uri="{BB962C8B-B14F-4D97-AF65-F5344CB8AC3E}">
-        <p14:creationId xmlns:p14="http://schemas.microsoft.com/office/powerpoint/2010/main" val="4135665782"/>
+        <p14:creationId xmlns:p14="http://schemas.microsoft.com/office/powerpoint/2010/main" val="330316192"/>
       </p:ext>
     </p:extLst>
   </p:cSld>
@@ -4346,7 +4437,7 @@
           <p:cNvPr id="2" name="Title 1">
             <a:extLst>
               <a:ext uri="{FF2B5EF4-FFF2-40B4-BE49-F238E27FC236}">
-                <a16:creationId xmlns:a16="http://schemas.microsoft.com/office/drawing/2014/main" id="{0B3D3179-3C0C-48F8-BBB1-FFC884DF97D3}"/>
+                <a16:creationId xmlns:a16="http://schemas.microsoft.com/office/drawing/2014/main" id="{0FE5EFA7-34DC-4D49-9D19-66FEB5B1A4DC}"/>
               </a:ext>
             </a:extLst>
           </p:cNvPr>
@@ -4364,7 +4455,7 @@
           <a:p>
             <a:r>
               <a:rPr lang="en-US" dirty="0"/>
-              <a:t>HINF AFS - description</a:t>
+              <a:t>SAS and Autopilots - description</a:t>
             </a:r>
           </a:p>
         </p:txBody>
@@ -4374,7 +4465,7 @@
           <p:cNvPr id="3" name="Content Placeholder 2">
             <a:extLst>
               <a:ext uri="{FF2B5EF4-FFF2-40B4-BE49-F238E27FC236}">
-                <a16:creationId xmlns:a16="http://schemas.microsoft.com/office/drawing/2014/main" id="{EA7275B7-1FF9-4CFA-AC31-C95AFF473737}"/>
+                <a16:creationId xmlns:a16="http://schemas.microsoft.com/office/drawing/2014/main" id="{80383E03-0416-4112-A8F3-731AD8758C57}"/>
               </a:ext>
             </a:extLst>
           </p:cNvPr>
@@ -4388,153 +4479,107 @@
         <p:spPr/>
         <p:txBody>
           <a:bodyPr>
-            <a:normAutofit fontScale="62500" lnSpcReduction="20000"/>
+            <a:normAutofit fontScale="70000" lnSpcReduction="20000"/>
           </a:bodyPr>
           <a:lstStyle/>
           <a:p>
             <a:r>
               <a:rPr lang="en-US" dirty="0"/>
-              <a:t>4 inputs</a:t>
+              <a:t>Roll Damper</a:t>
             </a:r>
           </a:p>
           <a:p>
             <a:pPr lvl="1"/>
             <a:r>
               <a:rPr lang="en-US" dirty="0"/>
-              <a:t>L1</a:t>
+              <a:t>Gain</a:t>
             </a:r>
           </a:p>
           <a:p>
             <a:pPr lvl="1"/>
             <a:r>
               <a:rPr lang="en-US" dirty="0"/>
-              <a:t>R1</a:t>
+              <a:t>p to aileron</a:t>
+            </a:r>
+          </a:p>
+          <a:p>
+            <a:r>
+              <a:rPr lang="en-US" dirty="0"/>
+              <a:t>Pitch Controller (pitch attitude command)</a:t>
             </a:r>
           </a:p>
           <a:p>
             <a:pPr lvl="1"/>
             <a:r>
               <a:rPr lang="en-US" dirty="0"/>
-              <a:t>L4</a:t>
+              <a:t>PI</a:t>
             </a:r>
           </a:p>
           <a:p>
             <a:pPr lvl="1"/>
             <a:r>
               <a:rPr lang="en-US" dirty="0"/>
-              <a:t>R4</a:t>
-            </a:r>
-          </a:p>
-          <a:p>
-            <a:r>
-              <a:rPr lang="en-US" dirty="0"/>
-              <a:t>8 outputs</a:t>
+              <a:t>Theta error to elevator</a:t>
+            </a:r>
+          </a:p>
+          <a:p>
+            <a:r>
+              <a:rPr lang="en-US" dirty="0"/>
+              <a:t>Roll Controller (roll attitude command)</a:t>
             </a:r>
           </a:p>
           <a:p>
             <a:pPr lvl="1"/>
             <a:r>
-              <a:rPr lang="en-US" dirty="0" err="1"/>
-              <a:t>qcg</a:t>
-            </a:r>
-            <a:r>
-              <a:rPr lang="en-US" dirty="0"/>
-              <a:t>        [rad/s ]</a:t>
+              <a:rPr lang="en-US" dirty="0"/>
+              <a:t>PI</a:t>
             </a:r>
           </a:p>
           <a:p>
             <a:pPr lvl="1"/>
             <a:r>
-              <a:rPr lang="en-US" dirty="0" err="1"/>
-              <a:t>pcg</a:t>
-            </a:r>
-            <a:r>
-              <a:rPr lang="en-US" dirty="0"/>
-              <a:t>        [rad/s ]</a:t>
+              <a:rPr lang="en-US" dirty="0"/>
+              <a:t>phi error to elevator</a:t>
+            </a:r>
+          </a:p>
+          <a:p>
+            <a:r>
+              <a:rPr lang="en-US" dirty="0"/>
+              <a:t>Auto throttle (speed command)</a:t>
             </a:r>
           </a:p>
           <a:p>
             <a:pPr lvl="1"/>
             <a:r>
-              <a:rPr lang="en-US" dirty="0" err="1"/>
-              <a:t>nzCBfwd</a:t>
-            </a:r>
-            <a:r>
-              <a:rPr lang="en-US" dirty="0"/>
-              <a:t>    [ft/s^2]</a:t>
+              <a:rPr lang="en-US" dirty="0"/>
+              <a:t>PI</a:t>
             </a:r>
           </a:p>
           <a:p>
             <a:pPr lvl="1"/>
             <a:r>
-              <a:rPr lang="en-US" dirty="0" err="1"/>
-              <a:t>nzCBaft</a:t>
-            </a:r>
-            <a:r>
-              <a:rPr lang="en-US" dirty="0"/>
-              <a:t>    [ft/s^2]</a:t>
+              <a:rPr lang="en-US" dirty="0"/>
+              <a:t>u error to thrust</a:t>
+            </a:r>
+          </a:p>
+          <a:p>
+            <a:r>
+              <a:rPr lang="en-US" dirty="0"/>
+              <a:t>Altitude hold</a:t>
             </a:r>
           </a:p>
           <a:p>
             <a:pPr lvl="1"/>
             <a:r>
-              <a:rPr lang="en-US" dirty="0" err="1"/>
-              <a:t>nzLwingfwd</a:t>
-            </a:r>
-            <a:r>
-              <a:rPr lang="en-US" dirty="0"/>
-              <a:t> [ft/s^2]</a:t>
+              <a:rPr lang="en-US" dirty="0"/>
+              <a:t>Gain</a:t>
             </a:r>
           </a:p>
           <a:p>
             <a:pPr lvl="1"/>
             <a:r>
-              <a:rPr lang="en-US" dirty="0" err="1"/>
-              <a:t>nzLwingaft</a:t>
-            </a:r>
-            <a:r>
-              <a:rPr lang="en-US" dirty="0"/>
-              <a:t> [ft/s^2]</a:t>
-            </a:r>
-          </a:p>
-          <a:p>
-            <a:pPr lvl="1"/>
-            <a:r>
-              <a:rPr lang="en-US" dirty="0" err="1"/>
-              <a:t>nzRwingfwd</a:t>
-            </a:r>
-            <a:r>
-              <a:rPr lang="en-US" dirty="0"/>
-              <a:t> [ft/s^2]</a:t>
-            </a:r>
-          </a:p>
-          <a:p>
-            <a:pPr lvl="1"/>
-            <a:r>
-              <a:rPr lang="en-US" dirty="0" err="1"/>
-              <a:t>nzRwingaft</a:t>
-            </a:r>
-            <a:r>
-              <a:rPr lang="en-US" dirty="0"/>
-              <a:t> [ft/s^2]</a:t>
-            </a:r>
-          </a:p>
-          <a:p>
-            <a:r>
-              <a:rPr lang="en-US" dirty="0"/>
-              <a:t>Fixed controller for all airspeeds</a:t>
-            </a:r>
-          </a:p>
-          <a:p>
-            <a:r>
-              <a:rPr lang="en-US" dirty="0"/>
-              <a:t>15 states</a:t>
-            </a:r>
-          </a:p>
-          <a:p>
-            <a:r>
-              <a:rPr lang="en-US" dirty="0"/>
-              <a:t>Targets 2 flutter modes</a:t>
+              <a:rPr lang="en-US" dirty="0"/>
+              <a:t>h error to theta command (pitch controller input) </a:t>
             </a:r>
           </a:p>
         </p:txBody>
@@ -4542,7 +4587,7 @@
     </p:spTree>
     <p:extLst>
       <p:ext uri="{BB962C8B-B14F-4D97-AF65-F5344CB8AC3E}">
-        <p14:creationId xmlns:p14="http://schemas.microsoft.com/office/powerpoint/2010/main" val="3638185937"/>
+        <p14:creationId xmlns:p14="http://schemas.microsoft.com/office/powerpoint/2010/main" val="4135665782"/>
       </p:ext>
     </p:extLst>
   </p:cSld>
@@ -4592,7 +4637,7 @@
           <a:p>
             <a:r>
               <a:rPr lang="en-US" dirty="0"/>
-              <a:t>MIDAAS AFS - description</a:t>
+              <a:t>HINF AFS - description</a:t>
             </a:r>
           </a:p>
         </p:txBody>
@@ -4756,7 +4801,7 @@
           <a:p>
             <a:r>
               <a:rPr lang="en-US" dirty="0"/>
-              <a:t>2 states</a:t>
+              <a:t>15 states</a:t>
             </a:r>
           </a:p>
           <a:p>
@@ -4764,17 +4809,13 @@
               <a:rPr lang="en-US" dirty="0"/>
               <a:t>Targets 2 flutter modes</a:t>
             </a:r>
-          </a:p>
-          <a:p>
-            <a:pPr lvl="1"/>
-            <a:endParaRPr lang="en-US" dirty="0"/>
           </a:p>
         </p:txBody>
       </p:sp>
     </p:spTree>
     <p:extLst>
       <p:ext uri="{BB962C8B-B14F-4D97-AF65-F5344CB8AC3E}">
-        <p14:creationId xmlns:p14="http://schemas.microsoft.com/office/powerpoint/2010/main" val="1900568347"/>
+        <p14:creationId xmlns:p14="http://schemas.microsoft.com/office/powerpoint/2010/main" val="3638185937"/>
       </p:ext>
     </p:extLst>
   </p:cSld>
@@ -4824,7 +4865,7 @@
           <a:p>
             <a:r>
               <a:rPr lang="en-US" dirty="0"/>
-              <a:t>ILAF AFS - description</a:t>
+              <a:t>MIDAAS AFS - description</a:t>
             </a:r>
           </a:p>
         </p:txBody>
@@ -4848,26 +4889,69 @@
         <p:spPr/>
         <p:txBody>
           <a:bodyPr>
-            <a:normAutofit lnSpcReduction="10000"/>
+            <a:normAutofit fontScale="62500" lnSpcReduction="20000"/>
           </a:bodyPr>
           <a:lstStyle/>
           <a:p>
             <a:r>
               <a:rPr lang="en-US" dirty="0"/>
-              <a:t>1 Input</a:t>
+              <a:t>4 inputs</a:t>
             </a:r>
           </a:p>
           <a:p>
             <a:pPr lvl="1"/>
             <a:r>
               <a:rPr lang="en-US" dirty="0"/>
-              <a:t>Symmetric Body flaps (L1+R1)</a:t>
-            </a:r>
-          </a:p>
-          <a:p>
-            <a:r>
-              <a:rPr lang="en-US" dirty="0"/>
-              <a:t>2 outputs</a:t>
+              <a:t>L1</a:t>
+            </a:r>
+          </a:p>
+          <a:p>
+            <a:pPr lvl="1"/>
+            <a:r>
+              <a:rPr lang="en-US" dirty="0"/>
+              <a:t>R1</a:t>
+            </a:r>
+          </a:p>
+          <a:p>
+            <a:pPr lvl="1"/>
+            <a:r>
+              <a:rPr lang="en-US" dirty="0"/>
+              <a:t>L4</a:t>
+            </a:r>
+          </a:p>
+          <a:p>
+            <a:pPr lvl="1"/>
+            <a:r>
+              <a:rPr lang="en-US" dirty="0"/>
+              <a:t>R4</a:t>
+            </a:r>
+          </a:p>
+          <a:p>
+            <a:r>
+              <a:rPr lang="en-US" dirty="0"/>
+              <a:t>8 outputs</a:t>
+            </a:r>
+          </a:p>
+          <a:p>
+            <a:pPr lvl="1"/>
+            <a:r>
+              <a:rPr lang="en-US" dirty="0" err="1"/>
+              <a:t>qcg</a:t>
+            </a:r>
+            <a:r>
+              <a:rPr lang="en-US" dirty="0"/>
+              <a:t>        [rad/s ]</a:t>
+            </a:r>
+          </a:p>
+          <a:p>
+            <a:pPr lvl="1"/>
+            <a:r>
+              <a:rPr lang="en-US" dirty="0" err="1"/>
+              <a:t>pcg</a:t>
+            </a:r>
+            <a:r>
+              <a:rPr lang="en-US" dirty="0"/>
+              <a:t>        [rad/s ]</a:t>
             </a:r>
           </a:p>
           <a:p>
@@ -4893,35 +4977,77 @@
             </a:r>
           </a:p>
           <a:p>
-            <a:r>
-              <a:rPr lang="en-US" dirty="0"/>
-              <a:t>Gain scheduled with airspeed – a net gain, no change in dynamics.</a:t>
-            </a:r>
-          </a:p>
-          <a:p>
-            <a:r>
-              <a:rPr lang="en-US" dirty="0"/>
-              <a:t>3 states</a:t>
-            </a:r>
-          </a:p>
-          <a:p>
-            <a:r>
-              <a:rPr lang="en-US" dirty="0"/>
-              <a:t>Controller designed SISO: output is difference between accelerometers</a:t>
-            </a:r>
-          </a:p>
-          <a:p>
-            <a:r>
-              <a:rPr lang="en-US" dirty="0"/>
-              <a:t>Targets a single flutter mode</a:t>
-            </a:r>
+            <a:pPr lvl="1"/>
+            <a:r>
+              <a:rPr lang="en-US" dirty="0" err="1"/>
+              <a:t>nzLwingfwd</a:t>
+            </a:r>
+            <a:r>
+              <a:rPr lang="en-US" dirty="0"/>
+              <a:t> [ft/s^2]</a:t>
+            </a:r>
+          </a:p>
+          <a:p>
+            <a:pPr lvl="1"/>
+            <a:r>
+              <a:rPr lang="en-US" dirty="0" err="1"/>
+              <a:t>nzLwingaft</a:t>
+            </a:r>
+            <a:r>
+              <a:rPr lang="en-US" dirty="0"/>
+              <a:t> [ft/s^2]</a:t>
+            </a:r>
+          </a:p>
+          <a:p>
+            <a:pPr lvl="1"/>
+            <a:r>
+              <a:rPr lang="en-US" dirty="0" err="1"/>
+              <a:t>nzRwingfwd</a:t>
+            </a:r>
+            <a:r>
+              <a:rPr lang="en-US" dirty="0"/>
+              <a:t> [ft/s^2]</a:t>
+            </a:r>
+          </a:p>
+          <a:p>
+            <a:pPr lvl="1"/>
+            <a:r>
+              <a:rPr lang="en-US" dirty="0" err="1"/>
+              <a:t>nzRwingaft</a:t>
+            </a:r>
+            <a:r>
+              <a:rPr lang="en-US" dirty="0"/>
+              <a:t> [ft/s^2]</a:t>
+            </a:r>
+          </a:p>
+          <a:p>
+            <a:r>
+              <a:rPr lang="en-US" dirty="0"/>
+              <a:t>Fixed controller for all airspeeds</a:t>
+            </a:r>
+          </a:p>
+          <a:p>
+            <a:r>
+              <a:rPr lang="en-US" dirty="0"/>
+              <a:t>2 states</a:t>
+            </a:r>
+          </a:p>
+          <a:p>
+            <a:r>
+              <a:rPr lang="en-US" dirty="0"/>
+              <a:t>Targets 2 flutter modes</a:t>
+            </a:r>
+          </a:p>
+          <a:p>
+            <a:pPr lvl="1"/>
+            <a:endParaRPr lang="en-US" dirty="0"/>
           </a:p>
         </p:txBody>
       </p:sp>
     </p:spTree>
     <p:extLst>
       <p:ext uri="{BB962C8B-B14F-4D97-AF65-F5344CB8AC3E}">
-        <p14:creationId xmlns:p14="http://schemas.microsoft.com/office/powerpoint/2010/main" val="2854955792"/>
+        <p14:creationId xmlns:p14="http://schemas.microsoft.com/office/powerpoint/2010/main" val="1900568347"/>
       </p:ext>
     </p:extLst>
   </p:cSld>
@@ -4953,7 +5079,7 @@
           <p:cNvPr id="2" name="Title 1">
             <a:extLst>
               <a:ext uri="{FF2B5EF4-FFF2-40B4-BE49-F238E27FC236}">
-                <a16:creationId xmlns:a16="http://schemas.microsoft.com/office/drawing/2014/main" id="{3989786B-CB65-461C-B9B1-035D70F6B30F}"/>
+                <a16:creationId xmlns:a16="http://schemas.microsoft.com/office/drawing/2014/main" id="{0B3D3179-3C0C-48F8-BBB1-FFC884DF97D3}"/>
               </a:ext>
             </a:extLst>
           </p:cNvPr>
@@ -4971,374 +5097,96 @@
           <a:p>
             <a:r>
               <a:rPr lang="en-US" dirty="0"/>
-              <a:t>Robust Margin Summary</a:t>
-            </a:r>
-          </a:p>
-        </p:txBody>
-      </p:sp>
-      <p:sp>
-        <p:nvSpPr>
-          <p:cNvPr id="4" name="TextBox 3">
-            <a:extLst>
-              <a:ext uri="{FF2B5EF4-FFF2-40B4-BE49-F238E27FC236}">
-                <a16:creationId xmlns:a16="http://schemas.microsoft.com/office/drawing/2014/main" id="{419F02A6-B46A-4074-91EE-6C394974F7DE}"/>
-              </a:ext>
-            </a:extLst>
-          </p:cNvPr>
-          <p:cNvSpPr txBox="1"/>
-          <p:nvPr/>
-        </p:nvSpPr>
-        <p:spPr>
-          <a:xfrm>
-            <a:off x="1164658" y="1863942"/>
-            <a:ext cx="4588115" cy="2031325"/>
-          </a:xfrm>
-          <a:prstGeom prst="rect">
-            <a:avLst/>
-          </a:prstGeom>
-          <a:noFill/>
-        </p:spPr>
-        <p:txBody>
-          <a:bodyPr wrap="none" rtlCol="0">
-            <a:spAutoFit/>
+              <a:t>ILAF AFS - description</a:t>
+            </a:r>
+          </a:p>
+        </p:txBody>
+      </p:sp>
+      <p:sp>
+        <p:nvSpPr>
+          <p:cNvPr id="3" name="Content Placeholder 2">
+            <a:extLst>
+              <a:ext uri="{FF2B5EF4-FFF2-40B4-BE49-F238E27FC236}">
+                <a16:creationId xmlns:a16="http://schemas.microsoft.com/office/drawing/2014/main" id="{EA7275B7-1FF9-4CFA-AC31-C95AFF473737}"/>
+              </a:ext>
+            </a:extLst>
+          </p:cNvPr>
+          <p:cNvSpPr>
+            <a:spLocks noGrp="1"/>
+          </p:cNvSpPr>
+          <p:nvPr>
+            <p:ph idx="1"/>
+          </p:nvPr>
+        </p:nvSpPr>
+        <p:spPr/>
+        <p:txBody>
+          <a:bodyPr>
+            <a:normAutofit lnSpcReduction="10000"/>
           </a:bodyPr>
           <a:lstStyle/>
           <a:p>
             <a:r>
-              <a:rPr lang="en-US" sz="1400" b="1" dirty="0">
-                <a:latin typeface="Courier New" panose="02070309020205020404" pitchFamily="49" charset="0"/>
-                <a:cs typeface="Courier New" panose="02070309020205020404" pitchFamily="49" charset="0"/>
-              </a:rPr>
-              <a:t>HINF</a:t>
-            </a:r>
-          </a:p>
-          <a:p>
-            <a:r>
-              <a:rPr lang="en-US" sz="1400" dirty="0">
-                <a:highlight>
-                  <a:srgbClr val="FFFF00"/>
-                </a:highlight>
-                <a:latin typeface="Courier New" panose="02070309020205020404" pitchFamily="49" charset="0"/>
-                <a:cs typeface="Courier New" panose="02070309020205020404" pitchFamily="49" charset="0"/>
-              </a:rPr>
-              <a:t>Robust Flutter Speed: 40.8 m/s</a:t>
-            </a:r>
-          </a:p>
-          <a:p>
-            <a:r>
-              <a:rPr lang="en-US" sz="1400" dirty="0">
-                <a:latin typeface="Courier New" panose="02070309020205020404" pitchFamily="49" charset="0"/>
-                <a:cs typeface="Courier New" panose="02070309020205020404" pitchFamily="49" charset="0"/>
-              </a:rPr>
-              <a:t>Absolute Flutter Speed: 42.0 m/s</a:t>
-            </a:r>
-          </a:p>
-          <a:p>
-            <a:r>
-              <a:rPr lang="en-US" sz="1400" dirty="0">
-                <a:latin typeface="Courier New" panose="02070309020205020404" pitchFamily="49" charset="0"/>
-                <a:cs typeface="Courier New" panose="02070309020205020404" pitchFamily="49" charset="0"/>
-              </a:rPr>
-              <a:t>   Individual RFS:</a:t>
-            </a:r>
-          </a:p>
-          <a:p>
-            <a:r>
-              <a:rPr lang="en-US" sz="1400" dirty="0">
-                <a:latin typeface="Courier New" panose="02070309020205020404" pitchFamily="49" charset="0"/>
-                <a:cs typeface="Courier New" panose="02070309020205020404" pitchFamily="49" charset="0"/>
-              </a:rPr>
-              <a:t>   RFS due to PM at Input: 40.8 m/s</a:t>
-            </a:r>
-          </a:p>
-          <a:p>
-            <a:r>
-              <a:rPr lang="en-US" sz="1400" dirty="0">
-                <a:latin typeface="Courier New" panose="02070309020205020404" pitchFamily="49" charset="0"/>
-                <a:cs typeface="Courier New" panose="02070309020205020404" pitchFamily="49" charset="0"/>
-              </a:rPr>
-              <a:t>   RFS due to GM at Input: 42.0 m/s</a:t>
-            </a:r>
-          </a:p>
-          <a:p>
-            <a:r>
-              <a:rPr lang="en-US" sz="1400" dirty="0">
-                <a:latin typeface="Courier New" panose="02070309020205020404" pitchFamily="49" charset="0"/>
-                <a:cs typeface="Courier New" panose="02070309020205020404" pitchFamily="49" charset="0"/>
-              </a:rPr>
-              <a:t>   RFS due to PM at Output: 41.1 m/s</a:t>
-            </a:r>
-          </a:p>
-          <a:p>
-            <a:r>
-              <a:rPr lang="en-US" sz="1400" dirty="0">
-                <a:latin typeface="Courier New" panose="02070309020205020404" pitchFamily="49" charset="0"/>
-                <a:cs typeface="Courier New" panose="02070309020205020404" pitchFamily="49" charset="0"/>
-              </a:rPr>
-              <a:t>   RFS due to GM at Output: 42.0 m/s</a:t>
-            </a:r>
-          </a:p>
-          <a:p>
-            <a:r>
-              <a:rPr lang="en-US" sz="1400" dirty="0">
-                <a:latin typeface="Courier New" panose="02070309020205020404" pitchFamily="49" charset="0"/>
-                <a:cs typeface="Courier New" panose="02070309020205020404" pitchFamily="49" charset="0"/>
-              </a:rPr>
-              <a:t>   RFS due to GM at Multi-Input: 20.0 m/s</a:t>
-            </a:r>
-            <a:endParaRPr lang="en-US" dirty="0">
-              <a:latin typeface="Courier New" panose="02070309020205020404" pitchFamily="49" charset="0"/>
-              <a:cs typeface="Courier New" panose="02070309020205020404" pitchFamily="49" charset="0"/>
-            </a:endParaRPr>
-          </a:p>
-        </p:txBody>
-      </p:sp>
-      <p:sp>
-        <p:nvSpPr>
-          <p:cNvPr id="5" name="TextBox 4">
-            <a:extLst>
-              <a:ext uri="{FF2B5EF4-FFF2-40B4-BE49-F238E27FC236}">
-                <a16:creationId xmlns:a16="http://schemas.microsoft.com/office/drawing/2014/main" id="{5015397D-2CB5-45D3-95AB-C2C1D7798951}"/>
-              </a:ext>
-            </a:extLst>
-          </p:cNvPr>
-          <p:cNvSpPr txBox="1"/>
-          <p:nvPr/>
-        </p:nvSpPr>
-        <p:spPr>
-          <a:xfrm>
-            <a:off x="6545180" y="1863941"/>
-            <a:ext cx="4588115" cy="2031325"/>
-          </a:xfrm>
-          <a:prstGeom prst="rect">
-            <a:avLst/>
-          </a:prstGeom>
-          <a:noFill/>
-        </p:spPr>
-        <p:txBody>
-          <a:bodyPr wrap="none" rtlCol="0">
-            <a:spAutoFit/>
-          </a:bodyPr>
-          <a:lstStyle/>
-          <a:p>
-            <a:r>
-              <a:rPr lang="en-US" sz="1400" b="1" dirty="0">
-                <a:latin typeface="Courier New" panose="02070309020205020404" pitchFamily="49" charset="0"/>
-                <a:cs typeface="Courier New" panose="02070309020205020404" pitchFamily="49" charset="0"/>
-              </a:rPr>
-              <a:t>MIDAAS</a:t>
-            </a:r>
-          </a:p>
-          <a:p>
-            <a:r>
-              <a:rPr lang="en-US" sz="1400" dirty="0">
-                <a:highlight>
-                  <a:srgbClr val="FFFF00"/>
-                </a:highlight>
-                <a:latin typeface="Courier New" panose="02070309020205020404" pitchFamily="49" charset="0"/>
-                <a:cs typeface="Courier New" panose="02070309020205020404" pitchFamily="49" charset="0"/>
-              </a:rPr>
-              <a:t>Robust Flutter Speed: 36.3 m/s</a:t>
-            </a:r>
-          </a:p>
-          <a:p>
-            <a:r>
-              <a:rPr lang="en-US" sz="1400" dirty="0">
-                <a:latin typeface="Courier New" panose="02070309020205020404" pitchFamily="49" charset="0"/>
-                <a:cs typeface="Courier New" panose="02070309020205020404" pitchFamily="49" charset="0"/>
-              </a:rPr>
-              <a:t>Absolute Flutter Speed: 40.5 m/s</a:t>
-            </a:r>
-          </a:p>
-          <a:p>
-            <a:r>
-              <a:rPr lang="en-US" sz="1400" dirty="0">
-                <a:latin typeface="Courier New" panose="02070309020205020404" pitchFamily="49" charset="0"/>
-                <a:cs typeface="Courier New" panose="02070309020205020404" pitchFamily="49" charset="0"/>
-              </a:rPr>
-              <a:t>   Individual RFS:</a:t>
-            </a:r>
-          </a:p>
-          <a:p>
-            <a:r>
-              <a:rPr lang="en-US" sz="1400" dirty="0">
-                <a:latin typeface="Courier New" panose="02070309020205020404" pitchFamily="49" charset="0"/>
-                <a:cs typeface="Courier New" panose="02070309020205020404" pitchFamily="49" charset="0"/>
-              </a:rPr>
-              <a:t>   RFS due to PM at Input: 37.1 m/s</a:t>
-            </a:r>
-          </a:p>
-          <a:p>
-            <a:r>
-              <a:rPr lang="en-US" sz="1400" dirty="0">
-                <a:latin typeface="Courier New" panose="02070309020205020404" pitchFamily="49" charset="0"/>
-                <a:cs typeface="Courier New" panose="02070309020205020404" pitchFamily="49" charset="0"/>
-              </a:rPr>
-              <a:t>   RFS due to GM at Input: 36.7 m/s</a:t>
-            </a:r>
-          </a:p>
-          <a:p>
-            <a:r>
-              <a:rPr lang="en-US" sz="1400" dirty="0">
-                <a:latin typeface="Courier New" panose="02070309020205020404" pitchFamily="49" charset="0"/>
-                <a:cs typeface="Courier New" panose="02070309020205020404" pitchFamily="49" charset="0"/>
-              </a:rPr>
-              <a:t>   RFS due to PM at Output: 36.3 m/s</a:t>
-            </a:r>
-          </a:p>
-          <a:p>
-            <a:r>
-              <a:rPr lang="en-US" sz="1400" dirty="0">
-                <a:latin typeface="Courier New" panose="02070309020205020404" pitchFamily="49" charset="0"/>
-                <a:cs typeface="Courier New" panose="02070309020205020404" pitchFamily="49" charset="0"/>
-              </a:rPr>
-              <a:t>   RFS due to GM at Output: 37.5 m/s</a:t>
-            </a:r>
-          </a:p>
-          <a:p>
-            <a:r>
-              <a:rPr lang="en-US" sz="1400" dirty="0">
-                <a:latin typeface="Courier New" panose="02070309020205020404" pitchFamily="49" charset="0"/>
-                <a:cs typeface="Courier New" panose="02070309020205020404" pitchFamily="49" charset="0"/>
-              </a:rPr>
-              <a:t>   RFS due to GM at Multi-Input: 34.5 m/s</a:t>
-            </a:r>
-          </a:p>
-        </p:txBody>
-      </p:sp>
-      <p:sp>
-        <p:nvSpPr>
-          <p:cNvPr id="6" name="TextBox 5">
-            <a:extLst>
-              <a:ext uri="{FF2B5EF4-FFF2-40B4-BE49-F238E27FC236}">
-                <a16:creationId xmlns:a16="http://schemas.microsoft.com/office/drawing/2014/main" id="{E7F89509-8B87-4442-90E5-C894E0215A58}"/>
-              </a:ext>
-            </a:extLst>
-          </p:cNvPr>
-          <p:cNvSpPr txBox="1"/>
-          <p:nvPr/>
-        </p:nvSpPr>
-        <p:spPr>
-          <a:xfrm>
-            <a:off x="4251122" y="4461550"/>
-            <a:ext cx="4588115" cy="2031325"/>
-          </a:xfrm>
-          <a:prstGeom prst="rect">
-            <a:avLst/>
-          </a:prstGeom>
-          <a:noFill/>
-        </p:spPr>
-        <p:txBody>
-          <a:bodyPr wrap="none" rtlCol="0">
-            <a:spAutoFit/>
-          </a:bodyPr>
-          <a:lstStyle/>
-          <a:p>
-            <a:r>
-              <a:rPr lang="en-US" sz="1400" b="1" dirty="0">
-                <a:latin typeface="Courier New" panose="02070309020205020404" pitchFamily="49" charset="0"/>
-                <a:cs typeface="Courier New" panose="02070309020205020404" pitchFamily="49" charset="0"/>
-              </a:rPr>
-              <a:t>ILAF</a:t>
-            </a:r>
-          </a:p>
-          <a:p>
-            <a:r>
-              <a:rPr lang="en-US" sz="1400" dirty="0">
-                <a:highlight>
-                  <a:srgbClr val="FFFF00"/>
-                </a:highlight>
-                <a:latin typeface="Courier New" panose="02070309020205020404" pitchFamily="49" charset="0"/>
-                <a:cs typeface="Courier New" panose="02070309020205020404" pitchFamily="49" charset="0"/>
-              </a:rPr>
-              <a:t>Robust Flutter Speed: 31.2 m/s</a:t>
-            </a:r>
-          </a:p>
-          <a:p>
-            <a:r>
-              <a:rPr lang="en-US" sz="1400" dirty="0">
-                <a:latin typeface="Courier New" panose="02070309020205020404" pitchFamily="49" charset="0"/>
-                <a:cs typeface="Courier New" panose="02070309020205020404" pitchFamily="49" charset="0"/>
-              </a:rPr>
-              <a:t>Absolute Flutter Speed: 37.0 m/s</a:t>
-            </a:r>
-          </a:p>
-          <a:p>
-            <a:r>
-              <a:rPr lang="en-US" sz="1400" dirty="0">
-                <a:latin typeface="Courier New" panose="02070309020205020404" pitchFamily="49" charset="0"/>
-                <a:cs typeface="Courier New" panose="02070309020205020404" pitchFamily="49" charset="0"/>
-              </a:rPr>
-              <a:t>   Individual RFS:</a:t>
-            </a:r>
-          </a:p>
-          <a:p>
-            <a:r>
-              <a:rPr lang="en-US" sz="1400" dirty="0">
-                <a:latin typeface="Courier New" panose="02070309020205020404" pitchFamily="49" charset="0"/>
-                <a:cs typeface="Courier New" panose="02070309020205020404" pitchFamily="49" charset="0"/>
-              </a:rPr>
-              <a:t>   RFS due to PM at Input: 33.8 m/s</a:t>
-            </a:r>
-          </a:p>
-          <a:p>
-            <a:r>
-              <a:rPr lang="en-US" sz="1400" dirty="0">
-                <a:latin typeface="Courier New" panose="02070309020205020404" pitchFamily="49" charset="0"/>
-                <a:cs typeface="Courier New" panose="02070309020205020404" pitchFamily="49" charset="0"/>
-              </a:rPr>
-              <a:t>   RFS due to GM at Input</a:t>
-            </a:r>
-            <a:r>
-              <a:rPr lang="en-US" sz="1400">
-                <a:latin typeface="Courier New" panose="02070309020205020404" pitchFamily="49" charset="0"/>
-                <a:cs typeface="Courier New" panose="02070309020205020404" pitchFamily="49" charset="0"/>
-              </a:rPr>
-              <a:t>: 34.8 </a:t>
-            </a:r>
-            <a:r>
-              <a:rPr lang="en-US" sz="1400" dirty="0">
-                <a:latin typeface="Courier New" panose="02070309020205020404" pitchFamily="49" charset="0"/>
-                <a:cs typeface="Courier New" panose="02070309020205020404" pitchFamily="49" charset="0"/>
-              </a:rPr>
-              <a:t>m/s</a:t>
-            </a:r>
-          </a:p>
-          <a:p>
-            <a:r>
-              <a:rPr lang="en-US" sz="1400" dirty="0">
-                <a:latin typeface="Courier New" panose="02070309020205020404" pitchFamily="49" charset="0"/>
-                <a:cs typeface="Courier New" panose="02070309020205020404" pitchFamily="49" charset="0"/>
-              </a:rPr>
-              <a:t>   RFS due to PM at Output: 33.3 m/s</a:t>
-            </a:r>
-          </a:p>
-          <a:p>
-            <a:r>
-              <a:rPr lang="en-US" sz="1400" dirty="0">
-                <a:latin typeface="Courier New" panose="02070309020205020404" pitchFamily="49" charset="0"/>
-                <a:cs typeface="Courier New" panose="02070309020205020404" pitchFamily="49" charset="0"/>
-              </a:rPr>
-              <a:t>   RFS due to GM at Output: 31.2 m/s</a:t>
-            </a:r>
-          </a:p>
-          <a:p>
-            <a:r>
-              <a:rPr lang="en-US" sz="1400" dirty="0">
-                <a:latin typeface="Courier New" panose="02070309020205020404" pitchFamily="49" charset="0"/>
-                <a:cs typeface="Courier New" panose="02070309020205020404" pitchFamily="49" charset="0"/>
-              </a:rPr>
-              <a:t>   </a:t>
-            </a:r>
-            <a:r>
-              <a:rPr lang="en-US" sz="1400" dirty="0">
-                <a:highlight>
-                  <a:srgbClr val="00FF00"/>
-                </a:highlight>
-                <a:latin typeface="Courier New" panose="02070309020205020404" pitchFamily="49" charset="0"/>
-                <a:cs typeface="Courier New" panose="02070309020205020404" pitchFamily="49" charset="0"/>
-              </a:rPr>
-              <a:t>RFS due to GM at Multi-Input: 32.5 m/s</a:t>
+              <a:rPr lang="en-US" dirty="0"/>
+              <a:t>1 Input</a:t>
+            </a:r>
+          </a:p>
+          <a:p>
+            <a:pPr lvl="1"/>
+            <a:r>
+              <a:rPr lang="en-US" dirty="0"/>
+              <a:t>Symmetric Body flaps (L1+R1)</a:t>
+            </a:r>
+          </a:p>
+          <a:p>
+            <a:r>
+              <a:rPr lang="en-US" dirty="0"/>
+              <a:t>2 outputs</a:t>
+            </a:r>
+          </a:p>
+          <a:p>
+            <a:pPr lvl="1"/>
+            <a:r>
+              <a:rPr lang="en-US" dirty="0" err="1"/>
+              <a:t>nzCBfwd</a:t>
+            </a:r>
+            <a:r>
+              <a:rPr lang="en-US" dirty="0"/>
+              <a:t>    [ft/s^2]</a:t>
+            </a:r>
+          </a:p>
+          <a:p>
+            <a:pPr lvl="1"/>
+            <a:r>
+              <a:rPr lang="en-US" dirty="0" err="1"/>
+              <a:t>nzCBaft</a:t>
+            </a:r>
+            <a:r>
+              <a:rPr lang="en-US" dirty="0"/>
+              <a:t>    [ft/s^2]</a:t>
+            </a:r>
+          </a:p>
+          <a:p>
+            <a:r>
+              <a:rPr lang="en-US" dirty="0"/>
+              <a:t>Gain scheduled with airspeed – a net gain, no change in dynamics.</a:t>
+            </a:r>
+          </a:p>
+          <a:p>
+            <a:r>
+              <a:rPr lang="en-US" dirty="0"/>
+              <a:t>3 states</a:t>
+            </a:r>
+          </a:p>
+          <a:p>
+            <a:r>
+              <a:rPr lang="en-US" dirty="0"/>
+              <a:t>Controller designed SISO: output is difference between accelerometers</a:t>
+            </a:r>
+          </a:p>
+          <a:p>
+            <a:r>
+              <a:rPr lang="en-US" dirty="0"/>
+              <a:t>Targets a single flutter mode</a:t>
             </a:r>
           </a:p>
         </p:txBody>
@@ -5346,7 +5194,7 @@
     </p:spTree>
     <p:extLst>
       <p:ext uri="{BB962C8B-B14F-4D97-AF65-F5344CB8AC3E}">
-        <p14:creationId xmlns:p14="http://schemas.microsoft.com/office/powerpoint/2010/main" val="2275782352"/>
+        <p14:creationId xmlns:p14="http://schemas.microsoft.com/office/powerpoint/2010/main" val="2854955792"/>
       </p:ext>
     </p:extLst>
   </p:cSld>
@@ -5378,7 +5226,7 @@
           <p:cNvPr id="2" name="Title 1">
             <a:extLst>
               <a:ext uri="{FF2B5EF4-FFF2-40B4-BE49-F238E27FC236}">
-                <a16:creationId xmlns:a16="http://schemas.microsoft.com/office/drawing/2014/main" id="{7149377C-658B-4730-B8EA-C2EEE8041CBF}"/>
+                <a16:creationId xmlns:a16="http://schemas.microsoft.com/office/drawing/2014/main" id="{3989786B-CB65-461C-B9B1-035D70F6B30F}"/>
               </a:ext>
             </a:extLst>
           </p:cNvPr>
@@ -5396,75 +5244,398 @@
           <a:p>
             <a:r>
               <a:rPr lang="en-US" dirty="0"/>
-              <a:t>HINF – Robustness Margins Results</a:t>
-            </a:r>
-          </a:p>
-        </p:txBody>
-      </p:sp>
-      <p:pic>
-        <p:nvPicPr>
-          <p:cNvPr id="5" name="Picture 4">
-            <a:extLst>
-              <a:ext uri="{FF2B5EF4-FFF2-40B4-BE49-F238E27FC236}">
-                <a16:creationId xmlns:a16="http://schemas.microsoft.com/office/drawing/2014/main" id="{8B0ED884-9899-45FD-A080-68AD553A3EC6}"/>
-              </a:ext>
-            </a:extLst>
-          </p:cNvPr>
-          <p:cNvPicPr>
-            <a:picLocks noChangeAspect="1"/>
-          </p:cNvPicPr>
+              <a:t>Robust Margin Summary</a:t>
+            </a:r>
+          </a:p>
+        </p:txBody>
+      </p:sp>
+      <p:sp>
+        <p:nvSpPr>
+          <p:cNvPr id="4" name="TextBox 3">
+            <a:extLst>
+              <a:ext uri="{FF2B5EF4-FFF2-40B4-BE49-F238E27FC236}">
+                <a16:creationId xmlns:a16="http://schemas.microsoft.com/office/drawing/2014/main" id="{419F02A6-B46A-4074-91EE-6C394974F7DE}"/>
+              </a:ext>
+            </a:extLst>
+          </p:cNvPr>
+          <p:cNvSpPr txBox="1"/>
           <p:nvPr/>
-        </p:nvPicPr>
-        <p:blipFill>
-          <a:blip r:embed="rId2"/>
-          <a:stretch>
-            <a:fillRect/>
-          </a:stretch>
-        </p:blipFill>
+        </p:nvSpPr>
         <p:spPr>
           <a:xfrm>
-            <a:off x="577294" y="1832135"/>
-            <a:ext cx="5166001" cy="3906000"/>
+            <a:off x="1164658" y="1863942"/>
+            <a:ext cx="4588115" cy="2031325"/>
           </a:xfrm>
           <a:prstGeom prst="rect">
             <a:avLst/>
           </a:prstGeom>
+          <a:noFill/>
         </p:spPr>
-      </p:pic>
-      <p:pic>
-        <p:nvPicPr>
-          <p:cNvPr id="3" name="Picture 2">
-            <a:extLst>
-              <a:ext uri="{FF2B5EF4-FFF2-40B4-BE49-F238E27FC236}">
-                <a16:creationId xmlns:a16="http://schemas.microsoft.com/office/drawing/2014/main" id="{4EF089D0-1334-41F5-AAC1-51E0D83EA4E1}"/>
-              </a:ext>
-            </a:extLst>
-          </p:cNvPr>
-          <p:cNvPicPr>
-            <a:picLocks noChangeAspect="1"/>
-          </p:cNvPicPr>
+        <p:txBody>
+          <a:bodyPr wrap="none" rtlCol="0">
+            <a:spAutoFit/>
+          </a:bodyPr>
+          <a:lstStyle/>
+          <a:p>
+            <a:r>
+              <a:rPr lang="en-US" sz="1400" b="1" dirty="0">
+                <a:latin typeface="Courier New" panose="02070309020205020404" pitchFamily="49" charset="0"/>
+                <a:cs typeface="Courier New" panose="02070309020205020404" pitchFamily="49" charset="0"/>
+              </a:rPr>
+              <a:t>HINF</a:t>
+            </a:r>
+          </a:p>
+          <a:p>
+            <a:r>
+              <a:rPr lang="en-US" sz="1400" dirty="0">
+                <a:highlight>
+                  <a:srgbClr val="FFFF00"/>
+                </a:highlight>
+                <a:latin typeface="Courier New" panose="02070309020205020404" pitchFamily="49" charset="0"/>
+                <a:cs typeface="Courier New" panose="02070309020205020404" pitchFamily="49" charset="0"/>
+              </a:rPr>
+              <a:t>Robust Flutter Speed: 40.8 m/s</a:t>
+            </a:r>
+          </a:p>
+          <a:p>
+            <a:r>
+              <a:rPr lang="en-US" sz="1400" dirty="0">
+                <a:latin typeface="Courier New" panose="02070309020205020404" pitchFamily="49" charset="0"/>
+                <a:cs typeface="Courier New" panose="02070309020205020404" pitchFamily="49" charset="0"/>
+              </a:rPr>
+              <a:t>Absolute Flutter Speed: 42.0 m/s</a:t>
+            </a:r>
+          </a:p>
+          <a:p>
+            <a:r>
+              <a:rPr lang="en-US" sz="1400" dirty="0">
+                <a:latin typeface="Courier New" panose="02070309020205020404" pitchFamily="49" charset="0"/>
+                <a:cs typeface="Courier New" panose="02070309020205020404" pitchFamily="49" charset="0"/>
+              </a:rPr>
+              <a:t>   Individual RFS:</a:t>
+            </a:r>
+          </a:p>
+          <a:p>
+            <a:r>
+              <a:rPr lang="en-US" sz="1400" dirty="0">
+                <a:latin typeface="Courier New" panose="02070309020205020404" pitchFamily="49" charset="0"/>
+                <a:cs typeface="Courier New" panose="02070309020205020404" pitchFamily="49" charset="0"/>
+              </a:rPr>
+              <a:t>   </a:t>
+            </a:r>
+            <a:r>
+              <a:rPr lang="en-US" sz="1400" dirty="0">
+                <a:highlight>
+                  <a:srgbClr val="FFFF00"/>
+                </a:highlight>
+                <a:latin typeface="Courier New" panose="02070309020205020404" pitchFamily="49" charset="0"/>
+                <a:cs typeface="Courier New" panose="02070309020205020404" pitchFamily="49" charset="0"/>
+              </a:rPr>
+              <a:t>RFS due to PM at Input: 40.8 m/s</a:t>
+            </a:r>
+          </a:p>
+          <a:p>
+            <a:r>
+              <a:rPr lang="en-US" sz="1400" dirty="0">
+                <a:latin typeface="Courier New" panose="02070309020205020404" pitchFamily="49" charset="0"/>
+                <a:cs typeface="Courier New" panose="02070309020205020404" pitchFamily="49" charset="0"/>
+              </a:rPr>
+              <a:t>   RFS due to GM at Input: 42.0 m/s</a:t>
+            </a:r>
+          </a:p>
+          <a:p>
+            <a:r>
+              <a:rPr lang="en-US" sz="1400" dirty="0">
+                <a:latin typeface="Courier New" panose="02070309020205020404" pitchFamily="49" charset="0"/>
+                <a:cs typeface="Courier New" panose="02070309020205020404" pitchFamily="49" charset="0"/>
+              </a:rPr>
+              <a:t>   RFS due to PM at Output: 41.1 m/s</a:t>
+            </a:r>
+          </a:p>
+          <a:p>
+            <a:r>
+              <a:rPr lang="en-US" sz="1400" dirty="0">
+                <a:latin typeface="Courier New" panose="02070309020205020404" pitchFamily="49" charset="0"/>
+                <a:cs typeface="Courier New" panose="02070309020205020404" pitchFamily="49" charset="0"/>
+              </a:rPr>
+              <a:t>   RFS due to GM at Output: 42.0 m/s</a:t>
+            </a:r>
+          </a:p>
+          <a:p>
+            <a:r>
+              <a:rPr lang="en-US" sz="1400" dirty="0">
+                <a:latin typeface="Courier New" panose="02070309020205020404" pitchFamily="49" charset="0"/>
+                <a:cs typeface="Courier New" panose="02070309020205020404" pitchFamily="49" charset="0"/>
+              </a:rPr>
+              <a:t>   RFS due to GM at Multi-Input: 20.0 m/s</a:t>
+            </a:r>
+            <a:endParaRPr lang="en-US" dirty="0">
+              <a:latin typeface="Courier New" panose="02070309020205020404" pitchFamily="49" charset="0"/>
+              <a:cs typeface="Courier New" panose="02070309020205020404" pitchFamily="49" charset="0"/>
+            </a:endParaRPr>
+          </a:p>
+        </p:txBody>
+      </p:sp>
+      <p:sp>
+        <p:nvSpPr>
+          <p:cNvPr id="5" name="TextBox 4">
+            <a:extLst>
+              <a:ext uri="{FF2B5EF4-FFF2-40B4-BE49-F238E27FC236}">
+                <a16:creationId xmlns:a16="http://schemas.microsoft.com/office/drawing/2014/main" id="{5015397D-2CB5-45D3-95AB-C2C1D7798951}"/>
+              </a:ext>
+            </a:extLst>
+          </p:cNvPr>
+          <p:cNvSpPr txBox="1"/>
           <p:nvPr/>
-        </p:nvPicPr>
-        <p:blipFill>
-          <a:blip r:embed="rId3"/>
-          <a:stretch>
-            <a:fillRect/>
-          </a:stretch>
-        </p:blipFill>
+        </p:nvSpPr>
         <p:spPr>
           <a:xfrm>
-            <a:off x="6015168" y="1832135"/>
-            <a:ext cx="5147551" cy="3906000"/>
+            <a:off x="6545180" y="1863941"/>
+            <a:ext cx="4588115" cy="2031325"/>
           </a:xfrm>
           <a:prstGeom prst="rect">
             <a:avLst/>
           </a:prstGeom>
+          <a:noFill/>
         </p:spPr>
-      </p:pic>
+        <p:txBody>
+          <a:bodyPr wrap="none" rtlCol="0">
+            <a:spAutoFit/>
+          </a:bodyPr>
+          <a:lstStyle/>
+          <a:p>
+            <a:r>
+              <a:rPr lang="en-US" sz="1400" b="1" dirty="0">
+                <a:latin typeface="Courier New" panose="02070309020205020404" pitchFamily="49" charset="0"/>
+                <a:cs typeface="Courier New" panose="02070309020205020404" pitchFamily="49" charset="0"/>
+              </a:rPr>
+              <a:t>MIDAAS</a:t>
+            </a:r>
+          </a:p>
+          <a:p>
+            <a:r>
+              <a:rPr lang="en-US" sz="1400" dirty="0">
+                <a:highlight>
+                  <a:srgbClr val="FFFF00"/>
+                </a:highlight>
+                <a:latin typeface="Courier New" panose="02070309020205020404" pitchFamily="49" charset="0"/>
+                <a:cs typeface="Courier New" panose="02070309020205020404" pitchFamily="49" charset="0"/>
+              </a:rPr>
+              <a:t>Robust Flutter Speed: 36.3 m/s</a:t>
+            </a:r>
+          </a:p>
+          <a:p>
+            <a:r>
+              <a:rPr lang="en-US" sz="1400" dirty="0">
+                <a:latin typeface="Courier New" panose="02070309020205020404" pitchFamily="49" charset="0"/>
+                <a:cs typeface="Courier New" panose="02070309020205020404" pitchFamily="49" charset="0"/>
+              </a:rPr>
+              <a:t>Absolute Flutter Speed: 40.5 m/s</a:t>
+            </a:r>
+          </a:p>
+          <a:p>
+            <a:r>
+              <a:rPr lang="en-US" sz="1400" dirty="0">
+                <a:latin typeface="Courier New" panose="02070309020205020404" pitchFamily="49" charset="0"/>
+                <a:cs typeface="Courier New" panose="02070309020205020404" pitchFamily="49" charset="0"/>
+              </a:rPr>
+              <a:t>   Individual RFS:</a:t>
+            </a:r>
+          </a:p>
+          <a:p>
+            <a:r>
+              <a:rPr lang="en-US" sz="1400" dirty="0">
+                <a:latin typeface="Courier New" panose="02070309020205020404" pitchFamily="49" charset="0"/>
+                <a:cs typeface="Courier New" panose="02070309020205020404" pitchFamily="49" charset="0"/>
+              </a:rPr>
+              <a:t>   RFS due to PM at Input: 37.1 m/s</a:t>
+            </a:r>
+          </a:p>
+          <a:p>
+            <a:r>
+              <a:rPr lang="en-US" sz="1400" dirty="0">
+                <a:latin typeface="Courier New" panose="02070309020205020404" pitchFamily="49" charset="0"/>
+                <a:cs typeface="Courier New" panose="02070309020205020404" pitchFamily="49" charset="0"/>
+              </a:rPr>
+              <a:t>   RFS due to GM at Input: 36.7 m/s</a:t>
+            </a:r>
+          </a:p>
+          <a:p>
+            <a:r>
+              <a:rPr lang="en-US" sz="1400" dirty="0">
+                <a:latin typeface="Courier New" panose="02070309020205020404" pitchFamily="49" charset="0"/>
+                <a:cs typeface="Courier New" panose="02070309020205020404" pitchFamily="49" charset="0"/>
+              </a:rPr>
+              <a:t>   </a:t>
+            </a:r>
+            <a:r>
+              <a:rPr lang="en-US" sz="1400" dirty="0">
+                <a:highlight>
+                  <a:srgbClr val="FFFF00"/>
+                </a:highlight>
+                <a:latin typeface="Courier New" panose="02070309020205020404" pitchFamily="49" charset="0"/>
+                <a:cs typeface="Courier New" panose="02070309020205020404" pitchFamily="49" charset="0"/>
+              </a:rPr>
+              <a:t>RFS due to PM at Output: 36.3 m/s</a:t>
+            </a:r>
+          </a:p>
+          <a:p>
+            <a:r>
+              <a:rPr lang="en-US" sz="1400" dirty="0">
+                <a:latin typeface="Courier New" panose="02070309020205020404" pitchFamily="49" charset="0"/>
+                <a:cs typeface="Courier New" panose="02070309020205020404" pitchFamily="49" charset="0"/>
+              </a:rPr>
+              <a:t>   RFS due to GM at Output: 37.5 m/s</a:t>
+            </a:r>
+          </a:p>
+          <a:p>
+            <a:r>
+              <a:rPr lang="en-US" sz="1400" dirty="0">
+                <a:latin typeface="Courier New" panose="02070309020205020404" pitchFamily="49" charset="0"/>
+                <a:cs typeface="Courier New" panose="02070309020205020404" pitchFamily="49" charset="0"/>
+              </a:rPr>
+              <a:t>   RFS due to GM at Multi-Input: 34.5 m/s</a:t>
+            </a:r>
+          </a:p>
+        </p:txBody>
+      </p:sp>
+      <p:sp>
+        <p:nvSpPr>
+          <p:cNvPr id="6" name="TextBox 5">
+            <a:extLst>
+              <a:ext uri="{FF2B5EF4-FFF2-40B4-BE49-F238E27FC236}">
+                <a16:creationId xmlns:a16="http://schemas.microsoft.com/office/drawing/2014/main" id="{E7F89509-8B87-4442-90E5-C894E0215A58}"/>
+              </a:ext>
+            </a:extLst>
+          </p:cNvPr>
+          <p:cNvSpPr txBox="1"/>
+          <p:nvPr/>
+        </p:nvSpPr>
+        <p:spPr>
+          <a:xfrm>
+            <a:off x="4251122" y="4461550"/>
+            <a:ext cx="4588115" cy="2031325"/>
+          </a:xfrm>
+          <a:prstGeom prst="rect">
+            <a:avLst/>
+          </a:prstGeom>
+          <a:noFill/>
+        </p:spPr>
+        <p:txBody>
+          <a:bodyPr wrap="none" rtlCol="0">
+            <a:spAutoFit/>
+          </a:bodyPr>
+          <a:lstStyle/>
+          <a:p>
+            <a:r>
+              <a:rPr lang="en-US" sz="1400" b="1" dirty="0">
+                <a:latin typeface="Courier New" panose="02070309020205020404" pitchFamily="49" charset="0"/>
+                <a:cs typeface="Courier New" panose="02070309020205020404" pitchFamily="49" charset="0"/>
+              </a:rPr>
+              <a:t>ILAF</a:t>
+            </a:r>
+          </a:p>
+          <a:p>
+            <a:r>
+              <a:rPr lang="en-US" sz="1400" dirty="0">
+                <a:highlight>
+                  <a:srgbClr val="FFFF00"/>
+                </a:highlight>
+                <a:latin typeface="Courier New" panose="02070309020205020404" pitchFamily="49" charset="0"/>
+                <a:cs typeface="Courier New" panose="02070309020205020404" pitchFamily="49" charset="0"/>
+              </a:rPr>
+              <a:t>Robust Flutter Speed: 31.2 m/s</a:t>
+            </a:r>
+          </a:p>
+          <a:p>
+            <a:r>
+              <a:rPr lang="en-US" sz="1400" dirty="0">
+                <a:latin typeface="Courier New" panose="02070309020205020404" pitchFamily="49" charset="0"/>
+                <a:cs typeface="Courier New" panose="02070309020205020404" pitchFamily="49" charset="0"/>
+              </a:rPr>
+              <a:t>Absolute Flutter Speed: 37.0 m/s</a:t>
+            </a:r>
+          </a:p>
+          <a:p>
+            <a:r>
+              <a:rPr lang="en-US" sz="1400" dirty="0">
+                <a:latin typeface="Courier New" panose="02070309020205020404" pitchFamily="49" charset="0"/>
+                <a:cs typeface="Courier New" panose="02070309020205020404" pitchFamily="49" charset="0"/>
+              </a:rPr>
+              <a:t>   Individual RFS:</a:t>
+            </a:r>
+          </a:p>
+          <a:p>
+            <a:r>
+              <a:rPr lang="en-US" sz="1400" dirty="0">
+                <a:latin typeface="Courier New" panose="02070309020205020404" pitchFamily="49" charset="0"/>
+                <a:cs typeface="Courier New" panose="02070309020205020404" pitchFamily="49" charset="0"/>
+              </a:rPr>
+              <a:t>   RFS due to PM at Input: 33.8 m/s</a:t>
+            </a:r>
+          </a:p>
+          <a:p>
+            <a:r>
+              <a:rPr lang="en-US" sz="1400" dirty="0">
+                <a:latin typeface="Courier New" panose="02070309020205020404" pitchFamily="49" charset="0"/>
+                <a:cs typeface="Courier New" panose="02070309020205020404" pitchFamily="49" charset="0"/>
+              </a:rPr>
+              <a:t>   RFS due to GM at Input: 34.8 m/s</a:t>
+            </a:r>
+          </a:p>
+          <a:p>
+            <a:r>
+              <a:rPr lang="en-US" sz="1400" dirty="0">
+                <a:latin typeface="Courier New" panose="02070309020205020404" pitchFamily="49" charset="0"/>
+                <a:cs typeface="Courier New" panose="02070309020205020404" pitchFamily="49" charset="0"/>
+              </a:rPr>
+              <a:t>   RFS due to PM at Output: 33.3 m/s</a:t>
+            </a:r>
+          </a:p>
+          <a:p>
+            <a:r>
+              <a:rPr lang="en-US" sz="1400" dirty="0">
+                <a:latin typeface="Courier New" panose="02070309020205020404" pitchFamily="49" charset="0"/>
+                <a:cs typeface="Courier New" panose="02070309020205020404" pitchFamily="49" charset="0"/>
+              </a:rPr>
+              <a:t>   </a:t>
+            </a:r>
+            <a:r>
+              <a:rPr lang="en-US" sz="1400" dirty="0">
+                <a:highlight>
+                  <a:srgbClr val="FFFF00"/>
+                </a:highlight>
+                <a:latin typeface="Courier New" panose="02070309020205020404" pitchFamily="49" charset="0"/>
+                <a:cs typeface="Courier New" panose="02070309020205020404" pitchFamily="49" charset="0"/>
+              </a:rPr>
+              <a:t>RFS due to GM at Output: 31.2 m/s</a:t>
+            </a:r>
+          </a:p>
+          <a:p>
+            <a:r>
+              <a:rPr lang="en-US" sz="1400" dirty="0">
+                <a:latin typeface="Courier New" panose="02070309020205020404" pitchFamily="49" charset="0"/>
+                <a:cs typeface="Courier New" panose="02070309020205020404" pitchFamily="49" charset="0"/>
+              </a:rPr>
+              <a:t>   </a:t>
+            </a:r>
+            <a:r>
+              <a:rPr lang="en-US" sz="1400" dirty="0">
+                <a:highlight>
+                  <a:srgbClr val="00FF00"/>
+                </a:highlight>
+                <a:latin typeface="Courier New" panose="02070309020205020404" pitchFamily="49" charset="0"/>
+                <a:cs typeface="Courier New" panose="02070309020205020404" pitchFamily="49" charset="0"/>
+              </a:rPr>
+              <a:t>RFS due to GM at Multi-Input: 32.5 m/s</a:t>
+            </a:r>
+          </a:p>
+        </p:txBody>
+      </p:sp>
     </p:spTree>
     <p:extLst>
       <p:ext uri="{BB962C8B-B14F-4D97-AF65-F5344CB8AC3E}">
-        <p14:creationId xmlns:p14="http://schemas.microsoft.com/office/powerpoint/2010/main" val="3193523092"/>
+        <p14:creationId xmlns:p14="http://schemas.microsoft.com/office/powerpoint/2010/main" val="2275782352"/>
       </p:ext>
     </p:extLst>
   </p:cSld>
@@ -5521,10 +5692,10 @@
       </p:sp>
       <p:pic>
         <p:nvPicPr>
-          <p:cNvPr id="3" name="Picture 2">
-            <a:extLst>
-              <a:ext uri="{FF2B5EF4-FFF2-40B4-BE49-F238E27FC236}">
-                <a16:creationId xmlns:a16="http://schemas.microsoft.com/office/drawing/2014/main" id="{13469745-3AB8-44BD-BCED-549B9FC82AF4}"/>
+          <p:cNvPr id="5" name="Picture 4">
+            <a:extLst>
+              <a:ext uri="{FF2B5EF4-FFF2-40B4-BE49-F238E27FC236}">
+                <a16:creationId xmlns:a16="http://schemas.microsoft.com/office/drawing/2014/main" id="{8B0ED884-9899-45FD-A080-68AD553A3EC6}"/>
               </a:ext>
             </a:extLst>
           </p:cNvPr>
@@ -5541,7 +5712,7 @@
         </p:blipFill>
         <p:spPr>
           <a:xfrm>
-            <a:off x="112194" y="1986139"/>
+            <a:off x="86406" y="1805666"/>
             <a:ext cx="5166001" cy="3906000"/>
           </a:xfrm>
           <a:prstGeom prst="rect">
@@ -5551,10 +5722,10 @@
       </p:pic>
       <p:pic>
         <p:nvPicPr>
-          <p:cNvPr id="5" name="Picture 4">
-            <a:extLst>
-              <a:ext uri="{FF2B5EF4-FFF2-40B4-BE49-F238E27FC236}">
-                <a16:creationId xmlns:a16="http://schemas.microsoft.com/office/drawing/2014/main" id="{FF2DD742-6C63-4586-AB07-93ED9535EBE2}"/>
+          <p:cNvPr id="6" name="Picture 5">
+            <a:extLst>
+              <a:ext uri="{FF2B5EF4-FFF2-40B4-BE49-F238E27FC236}">
+                <a16:creationId xmlns:a16="http://schemas.microsoft.com/office/drawing/2014/main" id="{33F85F8E-5604-4338-8096-AB08E20D92EA}"/>
               </a:ext>
             </a:extLst>
           </p:cNvPr>
@@ -5571,8 +5742,8 @@
         </p:blipFill>
         <p:spPr>
           <a:xfrm>
-            <a:off x="4665344" y="1986139"/>
-            <a:ext cx="7038676" cy="3906000"/>
+            <a:off x="4579374" y="1805666"/>
+            <a:ext cx="7564501" cy="3906000"/>
           </a:xfrm>
           <a:prstGeom prst="rect">
             <a:avLst/>
@@ -5582,7 +5753,7 @@
     </p:spTree>
     <p:extLst>
       <p:ext uri="{BB962C8B-B14F-4D97-AF65-F5344CB8AC3E}">
-        <p14:creationId xmlns:p14="http://schemas.microsoft.com/office/powerpoint/2010/main" val="73624296"/>
+        <p14:creationId xmlns:p14="http://schemas.microsoft.com/office/powerpoint/2010/main" val="3193523092"/>
       </p:ext>
     </p:extLst>
   </p:cSld>
@@ -5639,10 +5810,10 @@
       </p:sp>
       <p:pic>
         <p:nvPicPr>
-          <p:cNvPr id="5" name="Picture 4">
-            <a:extLst>
-              <a:ext uri="{FF2B5EF4-FFF2-40B4-BE49-F238E27FC236}">
-                <a16:creationId xmlns:a16="http://schemas.microsoft.com/office/drawing/2014/main" id="{27A27BB9-B685-42FB-B9D6-512956D3BB61}"/>
+          <p:cNvPr id="3" name="Picture 2">
+            <a:extLst>
+              <a:ext uri="{FF2B5EF4-FFF2-40B4-BE49-F238E27FC236}">
+                <a16:creationId xmlns:a16="http://schemas.microsoft.com/office/drawing/2014/main" id="{13469745-3AB8-44BD-BCED-549B9FC82AF4}"/>
               </a:ext>
             </a:extLst>
           </p:cNvPr>
@@ -5659,8 +5830,38 @@
         </p:blipFill>
         <p:spPr>
           <a:xfrm>
-            <a:off x="3512999" y="1625717"/>
+            <a:off x="0" y="1986139"/>
             <a:ext cx="5166001" cy="3906000"/>
+          </a:xfrm>
+          <a:prstGeom prst="rect">
+            <a:avLst/>
+          </a:prstGeom>
+        </p:spPr>
+      </p:pic>
+      <p:pic>
+        <p:nvPicPr>
+          <p:cNvPr id="6" name="Picture 5">
+            <a:extLst>
+              <a:ext uri="{FF2B5EF4-FFF2-40B4-BE49-F238E27FC236}">
+                <a16:creationId xmlns:a16="http://schemas.microsoft.com/office/drawing/2014/main" id="{675B9550-A12E-49CB-9975-C29B62356955}"/>
+              </a:ext>
+            </a:extLst>
+          </p:cNvPr>
+          <p:cNvPicPr>
+            <a:picLocks noChangeAspect="1"/>
+          </p:cNvPicPr>
+          <p:nvPr/>
+        </p:nvPicPr>
+        <p:blipFill>
+          <a:blip r:embed="rId3"/>
+          <a:stretch>
+            <a:fillRect/>
+          </a:stretch>
+        </p:blipFill>
+        <p:spPr>
+          <a:xfrm>
+            <a:off x="4349255" y="1986139"/>
+            <a:ext cx="7730551" cy="3906000"/>
           </a:xfrm>
           <a:prstGeom prst="rect">
             <a:avLst/>
@@ -5670,7 +5871,7 @@
     </p:spTree>
     <p:extLst>
       <p:ext uri="{BB962C8B-B14F-4D97-AF65-F5344CB8AC3E}">
-        <p14:creationId xmlns:p14="http://schemas.microsoft.com/office/powerpoint/2010/main" val="2422622659"/>
+        <p14:creationId xmlns:p14="http://schemas.microsoft.com/office/powerpoint/2010/main" val="73624296"/>
       </p:ext>
     </p:extLst>
   </p:cSld>

</xml_diff>

<commit_message>
added RFS_AFS.fig. added plot to Robustness/RobustnessAnalysis_02142019.pptx
</commit_message>
<xml_diff>
--- a/Software/Geri_Model_Package/Robustness/RobustnessAnalysis_02142019.pptx
+++ b/Software/Geri_Model_Package/Robustness/RobustnessAnalysis_02142019.pptx
@@ -274,7 +274,7 @@
           <a:p>
             <a:fld id="{FCE4FD93-E6F5-4F39-9C9D-0016CD56957B}" type="datetimeFigureOut">
               <a:rPr lang="en-US" smtClean="0"/>
-              <a:t>2/18/2019</a:t>
+              <a:t>2/19/2019</a:t>
             </a:fld>
             <a:endParaRPr lang="en-US"/>
           </a:p>
@@ -472,7 +472,7 @@
           <a:p>
             <a:fld id="{FCE4FD93-E6F5-4F39-9C9D-0016CD56957B}" type="datetimeFigureOut">
               <a:rPr lang="en-US" smtClean="0"/>
-              <a:t>2/18/2019</a:t>
+              <a:t>2/19/2019</a:t>
             </a:fld>
             <a:endParaRPr lang="en-US"/>
           </a:p>
@@ -680,7 +680,7 @@
           <a:p>
             <a:fld id="{FCE4FD93-E6F5-4F39-9C9D-0016CD56957B}" type="datetimeFigureOut">
               <a:rPr lang="en-US" smtClean="0"/>
-              <a:t>2/18/2019</a:t>
+              <a:t>2/19/2019</a:t>
             </a:fld>
             <a:endParaRPr lang="en-US"/>
           </a:p>
@@ -878,7 +878,7 @@
           <a:p>
             <a:fld id="{FCE4FD93-E6F5-4F39-9C9D-0016CD56957B}" type="datetimeFigureOut">
               <a:rPr lang="en-US" smtClean="0"/>
-              <a:t>2/18/2019</a:t>
+              <a:t>2/19/2019</a:t>
             </a:fld>
             <a:endParaRPr lang="en-US"/>
           </a:p>
@@ -1153,7 +1153,7 @@
           <a:p>
             <a:fld id="{FCE4FD93-E6F5-4F39-9C9D-0016CD56957B}" type="datetimeFigureOut">
               <a:rPr lang="en-US" smtClean="0"/>
-              <a:t>2/18/2019</a:t>
+              <a:t>2/19/2019</a:t>
             </a:fld>
             <a:endParaRPr lang="en-US"/>
           </a:p>
@@ -1418,7 +1418,7 @@
           <a:p>
             <a:fld id="{FCE4FD93-E6F5-4F39-9C9D-0016CD56957B}" type="datetimeFigureOut">
               <a:rPr lang="en-US" smtClean="0"/>
-              <a:t>2/18/2019</a:t>
+              <a:t>2/19/2019</a:t>
             </a:fld>
             <a:endParaRPr lang="en-US"/>
           </a:p>
@@ -1830,7 +1830,7 @@
           <a:p>
             <a:fld id="{FCE4FD93-E6F5-4F39-9C9D-0016CD56957B}" type="datetimeFigureOut">
               <a:rPr lang="en-US" smtClean="0"/>
-              <a:t>2/18/2019</a:t>
+              <a:t>2/19/2019</a:t>
             </a:fld>
             <a:endParaRPr lang="en-US"/>
           </a:p>
@@ -1971,7 +1971,7 @@
           <a:p>
             <a:fld id="{FCE4FD93-E6F5-4F39-9C9D-0016CD56957B}" type="datetimeFigureOut">
               <a:rPr lang="en-US" smtClean="0"/>
-              <a:t>2/18/2019</a:t>
+              <a:t>2/19/2019</a:t>
             </a:fld>
             <a:endParaRPr lang="en-US"/>
           </a:p>
@@ -2084,7 +2084,7 @@
           <a:p>
             <a:fld id="{FCE4FD93-E6F5-4F39-9C9D-0016CD56957B}" type="datetimeFigureOut">
               <a:rPr lang="en-US" smtClean="0"/>
-              <a:t>2/18/2019</a:t>
+              <a:t>2/19/2019</a:t>
             </a:fld>
             <a:endParaRPr lang="en-US"/>
           </a:p>
@@ -2395,7 +2395,7 @@
           <a:p>
             <a:fld id="{FCE4FD93-E6F5-4F39-9C9D-0016CD56957B}" type="datetimeFigureOut">
               <a:rPr lang="en-US" smtClean="0"/>
-              <a:t>2/18/2019</a:t>
+              <a:t>2/19/2019</a:t>
             </a:fld>
             <a:endParaRPr lang="en-US"/>
           </a:p>
@@ -2683,7 +2683,7 @@
           <a:p>
             <a:fld id="{FCE4FD93-E6F5-4F39-9C9D-0016CD56957B}" type="datetimeFigureOut">
               <a:rPr lang="en-US" smtClean="0"/>
-              <a:t>2/18/2019</a:t>
+              <a:t>2/19/2019</a:t>
             </a:fld>
             <a:endParaRPr lang="en-US"/>
           </a:p>
@@ -2924,7 +2924,7 @@
           <a:p>
             <a:fld id="{FCE4FD93-E6F5-4F39-9C9D-0016CD56957B}" type="datetimeFigureOut">
               <a:rPr lang="en-US" smtClean="0"/>
-              <a:t>2/18/2019</a:t>
+              <a:t>2/19/2019</a:t>
             </a:fld>
             <a:endParaRPr lang="en-US"/>
           </a:p>
@@ -4384,14 +4384,14 @@
           <a:effectLst/>
           <a:extLst>
             <a:ext uri="{909E8E84-426E-40dd-AFC4-6F175D3DCCD1}">
-              <a14:hiddenFill xmlns:a14="http://schemas.microsoft.com/office/drawing/2010/main" xmlns="">
+              <a14:hiddenFill xmlns="" xmlns:a14="http://schemas.microsoft.com/office/drawing/2010/main">
                 <a:solidFill>
                   <a:schemeClr val="accent1"/>
                 </a:solidFill>
               </a14:hiddenFill>
             </a:ext>
             <a:ext uri="{AF507438-7753-43e0-B8FC-AC1667EBCBE1}">
-              <a14:hiddenEffects xmlns:a14="http://schemas.microsoft.com/office/drawing/2010/main" xmlns="">
+              <a14:hiddenEffects xmlns="" xmlns:a14="http://schemas.microsoft.com/office/drawing/2010/main">
                 <a:effectLst>
                   <a:outerShdw dist="35921" dir="2700000" algn="ctr" rotWithShape="0">
                     <a:schemeClr val="bg2"/>
@@ -5237,7 +5237,12 @@
             <p:ph type="title"/>
           </p:nvPr>
         </p:nvSpPr>
-        <p:spPr/>
+        <p:spPr>
+          <a:xfrm>
+            <a:off x="838200" y="365126"/>
+            <a:ext cx="10515600" cy="850392"/>
+          </a:xfrm>
+        </p:spPr>
         <p:txBody>
           <a:bodyPr/>
           <a:lstStyle/>
@@ -5263,7 +5268,7 @@
         </p:nvSpPr>
         <p:spPr>
           <a:xfrm>
-            <a:off x="1164658" y="1863942"/>
+            <a:off x="635268" y="1413565"/>
             <a:ext cx="4588115" cy="2031325"/>
           </a:xfrm>
           <a:prstGeom prst="rect">
@@ -5390,7 +5395,7 @@
         </p:nvSpPr>
         <p:spPr>
           <a:xfrm>
-            <a:off x="6545180" y="1863941"/>
+            <a:off x="635267" y="4087376"/>
             <a:ext cx="4588115" cy="2031325"/>
           </a:xfrm>
           <a:prstGeom prst="rect">
@@ -5513,7 +5518,7 @@
         </p:nvSpPr>
         <p:spPr>
           <a:xfrm>
-            <a:off x="3801942" y="4249794"/>
+            <a:off x="6765685" y="1413565"/>
             <a:ext cx="4588115" cy="2031325"/>
           </a:xfrm>
           <a:prstGeom prst="rect">
@@ -5632,6 +5637,36 @@
           </a:p>
         </p:txBody>
       </p:sp>
+      <p:pic>
+        <p:nvPicPr>
+          <p:cNvPr id="7" name="Picture 6">
+            <a:extLst>
+              <a:ext uri="{FF2B5EF4-FFF2-40B4-BE49-F238E27FC236}">
+                <a16:creationId xmlns:a16="http://schemas.microsoft.com/office/drawing/2014/main" id="{FECB10F5-479E-48E5-B5F5-DBB34036376D}"/>
+              </a:ext>
+            </a:extLst>
+          </p:cNvPr>
+          <p:cNvPicPr>
+            <a:picLocks noChangeAspect="1"/>
+          </p:cNvPicPr>
+          <p:nvPr/>
+        </p:nvPicPr>
+        <p:blipFill>
+          <a:blip r:embed="rId2"/>
+          <a:stretch>
+            <a:fillRect/>
+          </a:stretch>
+        </p:blipFill>
+        <p:spPr>
+          <a:xfrm>
+            <a:off x="5978591" y="3642938"/>
+            <a:ext cx="6162301" cy="2920200"/>
+          </a:xfrm>
+          <a:prstGeom prst="rect">
+            <a:avLst/>
+          </a:prstGeom>
+        </p:spPr>
+      </p:pic>
     </p:spTree>
     <p:extLst>
       <p:ext uri="{BB962C8B-B14F-4D97-AF65-F5344CB8AC3E}">

</xml_diff>

<commit_message>
updated Robustness/RobustnessAnalysis_02142019.pptx with corrected ILAF controller. very minor mod to Robustness/RobustnessAnalysisAP.m in naming: 'BF_sym' to 'BFsym'.
</commit_message>
<xml_diff>
--- a/Software/Geri_Model_Package/Robustness/RobustnessAnalysis_02142019.pptx
+++ b/Software/Geri_Model_Package/Robustness/RobustnessAnalysis_02142019.pptx
@@ -274,7 +274,7 @@
           <a:p>
             <a:fld id="{FCE4FD93-E6F5-4F39-9C9D-0016CD56957B}" type="datetimeFigureOut">
               <a:rPr lang="en-US" smtClean="0"/>
-              <a:t>2/19/2019</a:t>
+              <a:t>3/6/2019</a:t>
             </a:fld>
             <a:endParaRPr lang="en-US"/>
           </a:p>
@@ -472,7 +472,7 @@
           <a:p>
             <a:fld id="{FCE4FD93-E6F5-4F39-9C9D-0016CD56957B}" type="datetimeFigureOut">
               <a:rPr lang="en-US" smtClean="0"/>
-              <a:t>2/19/2019</a:t>
+              <a:t>3/6/2019</a:t>
             </a:fld>
             <a:endParaRPr lang="en-US"/>
           </a:p>
@@ -680,7 +680,7 @@
           <a:p>
             <a:fld id="{FCE4FD93-E6F5-4F39-9C9D-0016CD56957B}" type="datetimeFigureOut">
               <a:rPr lang="en-US" smtClean="0"/>
-              <a:t>2/19/2019</a:t>
+              <a:t>3/6/2019</a:t>
             </a:fld>
             <a:endParaRPr lang="en-US"/>
           </a:p>
@@ -878,7 +878,7 @@
           <a:p>
             <a:fld id="{FCE4FD93-E6F5-4F39-9C9D-0016CD56957B}" type="datetimeFigureOut">
               <a:rPr lang="en-US" smtClean="0"/>
-              <a:t>2/19/2019</a:t>
+              <a:t>3/6/2019</a:t>
             </a:fld>
             <a:endParaRPr lang="en-US"/>
           </a:p>
@@ -1153,7 +1153,7 @@
           <a:p>
             <a:fld id="{FCE4FD93-E6F5-4F39-9C9D-0016CD56957B}" type="datetimeFigureOut">
               <a:rPr lang="en-US" smtClean="0"/>
-              <a:t>2/19/2019</a:t>
+              <a:t>3/6/2019</a:t>
             </a:fld>
             <a:endParaRPr lang="en-US"/>
           </a:p>
@@ -1418,7 +1418,7 @@
           <a:p>
             <a:fld id="{FCE4FD93-E6F5-4F39-9C9D-0016CD56957B}" type="datetimeFigureOut">
               <a:rPr lang="en-US" smtClean="0"/>
-              <a:t>2/19/2019</a:t>
+              <a:t>3/6/2019</a:t>
             </a:fld>
             <a:endParaRPr lang="en-US"/>
           </a:p>
@@ -1830,7 +1830,7 @@
           <a:p>
             <a:fld id="{FCE4FD93-E6F5-4F39-9C9D-0016CD56957B}" type="datetimeFigureOut">
               <a:rPr lang="en-US" smtClean="0"/>
-              <a:t>2/19/2019</a:t>
+              <a:t>3/6/2019</a:t>
             </a:fld>
             <a:endParaRPr lang="en-US"/>
           </a:p>
@@ -1971,7 +1971,7 @@
           <a:p>
             <a:fld id="{FCE4FD93-E6F5-4F39-9C9D-0016CD56957B}" type="datetimeFigureOut">
               <a:rPr lang="en-US" smtClean="0"/>
-              <a:t>2/19/2019</a:t>
+              <a:t>3/6/2019</a:t>
             </a:fld>
             <a:endParaRPr lang="en-US"/>
           </a:p>
@@ -2084,7 +2084,7 @@
           <a:p>
             <a:fld id="{FCE4FD93-E6F5-4F39-9C9D-0016CD56957B}" type="datetimeFigureOut">
               <a:rPr lang="en-US" smtClean="0"/>
-              <a:t>2/19/2019</a:t>
+              <a:t>3/6/2019</a:t>
             </a:fld>
             <a:endParaRPr lang="en-US"/>
           </a:p>
@@ -2395,7 +2395,7 @@
           <a:p>
             <a:fld id="{FCE4FD93-E6F5-4F39-9C9D-0016CD56957B}" type="datetimeFigureOut">
               <a:rPr lang="en-US" smtClean="0"/>
-              <a:t>2/19/2019</a:t>
+              <a:t>3/6/2019</a:t>
             </a:fld>
             <a:endParaRPr lang="en-US"/>
           </a:p>
@@ -2683,7 +2683,7 @@
           <a:p>
             <a:fld id="{FCE4FD93-E6F5-4F39-9C9D-0016CD56957B}" type="datetimeFigureOut">
               <a:rPr lang="en-US" smtClean="0"/>
-              <a:t>2/19/2019</a:t>
+              <a:t>3/6/2019</a:t>
             </a:fld>
             <a:endParaRPr lang="en-US"/>
           </a:p>
@@ -2924,7 +2924,7 @@
           <a:p>
             <a:fld id="{FCE4FD93-E6F5-4F39-9C9D-0016CD56957B}" type="datetimeFigureOut">
               <a:rPr lang="en-US" smtClean="0"/>
-              <a:t>2/19/2019</a:t>
+              <a:t>3/6/2019</a:t>
             </a:fld>
             <a:endParaRPr lang="en-US"/>
           </a:p>
@@ -3970,10 +3970,10 @@
       </p:sp>
       <p:pic>
         <p:nvPicPr>
-          <p:cNvPr id="3" name="Picture 2">
-            <a:extLst>
-              <a:ext uri="{FF2B5EF4-FFF2-40B4-BE49-F238E27FC236}">
-                <a16:creationId xmlns:a16="http://schemas.microsoft.com/office/drawing/2014/main" id="{E7FBAA03-5539-4EB1-AFE8-CBD649180EF6}"/>
+          <p:cNvPr id="5" name="Picture 4">
+            <a:extLst>
+              <a:ext uri="{FF2B5EF4-FFF2-40B4-BE49-F238E27FC236}">
+                <a16:creationId xmlns:a16="http://schemas.microsoft.com/office/drawing/2014/main" id="{37A566EE-7D98-43F9-9D78-26ABA160A706}"/>
               </a:ext>
             </a:extLst>
           </p:cNvPr>
@@ -3990,7 +3990,7 @@
         </p:blipFill>
         <p:spPr>
           <a:xfrm>
-            <a:off x="663921" y="2072767"/>
+            <a:off x="838200" y="1976514"/>
             <a:ext cx="5166001" cy="3906000"/>
           </a:xfrm>
           <a:prstGeom prst="rect">
@@ -4000,10 +4000,10 @@
       </p:pic>
       <p:pic>
         <p:nvPicPr>
-          <p:cNvPr id="6" name="Picture 5">
-            <a:extLst>
-              <a:ext uri="{FF2B5EF4-FFF2-40B4-BE49-F238E27FC236}">
-                <a16:creationId xmlns:a16="http://schemas.microsoft.com/office/drawing/2014/main" id="{69B6FF46-8C4D-4739-90E0-6D8E6CCF0ABC}"/>
+          <p:cNvPr id="7" name="Picture 6">
+            <a:extLst>
+              <a:ext uri="{FF2B5EF4-FFF2-40B4-BE49-F238E27FC236}">
+                <a16:creationId xmlns:a16="http://schemas.microsoft.com/office/drawing/2014/main" id="{09A12C4C-3157-4718-9BD3-BDC140347A3B}"/>
               </a:ext>
             </a:extLst>
           </p:cNvPr>
@@ -4020,7 +4020,7 @@
         </p:blipFill>
         <p:spPr>
           <a:xfrm>
-            <a:off x="5829922" y="2072767"/>
+            <a:off x="6187801" y="1976514"/>
             <a:ext cx="5166001" cy="3906000"/>
           </a:xfrm>
           <a:prstGeom prst="rect">
@@ -4088,10 +4088,10 @@
       </p:sp>
       <p:pic>
         <p:nvPicPr>
-          <p:cNvPr id="3" name="Picture 2">
-            <a:extLst>
-              <a:ext uri="{FF2B5EF4-FFF2-40B4-BE49-F238E27FC236}">
-                <a16:creationId xmlns:a16="http://schemas.microsoft.com/office/drawing/2014/main" id="{6190ECCD-F8D8-4A92-8BBC-0249C115F2FF}"/>
+          <p:cNvPr id="4" name="Picture 3">
+            <a:extLst>
+              <a:ext uri="{FF2B5EF4-FFF2-40B4-BE49-F238E27FC236}">
+                <a16:creationId xmlns:a16="http://schemas.microsoft.com/office/drawing/2014/main" id="{EE67D71D-2E6C-40F5-9F89-11F1B33D1D1D}"/>
               </a:ext>
             </a:extLst>
           </p:cNvPr>
@@ -4108,7 +4108,7 @@
         </p:blipFill>
         <p:spPr>
           <a:xfrm>
-            <a:off x="929999" y="1995764"/>
+            <a:off x="929999" y="2043890"/>
             <a:ext cx="5166001" cy="3906000"/>
           </a:xfrm>
           <a:prstGeom prst="rect">
@@ -4118,10 +4118,10 @@
       </p:pic>
       <p:pic>
         <p:nvPicPr>
-          <p:cNvPr id="6" name="Picture 5">
-            <a:extLst>
-              <a:ext uri="{FF2B5EF4-FFF2-40B4-BE49-F238E27FC236}">
-                <a16:creationId xmlns:a16="http://schemas.microsoft.com/office/drawing/2014/main" id="{E374EA53-030C-4B16-916F-3B77D3660E82}"/>
+          <p:cNvPr id="5" name="Picture 4">
+            <a:extLst>
+              <a:ext uri="{FF2B5EF4-FFF2-40B4-BE49-F238E27FC236}">
+                <a16:creationId xmlns:a16="http://schemas.microsoft.com/office/drawing/2014/main" id="{3BDAA67E-045A-4E05-AFC7-00C32F30B39F}"/>
               </a:ext>
             </a:extLst>
           </p:cNvPr>
@@ -4138,7 +4138,7 @@
         </p:blipFill>
         <p:spPr>
           <a:xfrm>
-            <a:off x="6256199" y="1995764"/>
+            <a:off x="6390952" y="2043890"/>
             <a:ext cx="5166001" cy="3906000"/>
           </a:xfrm>
           <a:prstGeom prst="rect">
@@ -4206,10 +4206,10 @@
       </p:sp>
       <p:pic>
         <p:nvPicPr>
-          <p:cNvPr id="5" name="Picture 4">
-            <a:extLst>
-              <a:ext uri="{FF2B5EF4-FFF2-40B4-BE49-F238E27FC236}">
-                <a16:creationId xmlns:a16="http://schemas.microsoft.com/office/drawing/2014/main" id="{CE9A899F-9366-4AB8-A324-9ACEF9F547C7}"/>
+          <p:cNvPr id="3" name="Picture 2">
+            <a:extLst>
+              <a:ext uri="{FF2B5EF4-FFF2-40B4-BE49-F238E27FC236}">
+                <a16:creationId xmlns:a16="http://schemas.microsoft.com/office/drawing/2014/main" id="{FD0C488E-DE1B-48B2-AB97-C4F78609E7D6}"/>
               </a:ext>
             </a:extLst>
           </p:cNvPr>
@@ -4226,7 +4226,7 @@
         </p:blipFill>
         <p:spPr>
           <a:xfrm>
-            <a:off x="2877732" y="2236396"/>
+            <a:off x="3214616" y="1995764"/>
             <a:ext cx="5166001" cy="3906000"/>
           </a:xfrm>
           <a:prstGeom prst="rect">
@@ -4384,14 +4384,14 @@
           <a:effectLst/>
           <a:extLst>
             <a:ext uri="{909E8E84-426E-40dd-AFC4-6F175D3DCCD1}">
-              <a14:hiddenFill xmlns="" xmlns:a14="http://schemas.microsoft.com/office/drawing/2010/main">
+              <a14:hiddenFill xmlns:a14="http://schemas.microsoft.com/office/drawing/2010/main" xmlns="">
                 <a:solidFill>
                   <a:schemeClr val="accent1"/>
                 </a:solidFill>
               </a14:hiddenFill>
             </a:ext>
             <a:ext uri="{AF507438-7753-43e0-B8FC-AC1667EBCBE1}">
-              <a14:hiddenEffects xmlns="" xmlns:a14="http://schemas.microsoft.com/office/drawing/2010/main">
+              <a14:hiddenEffects xmlns:a14="http://schemas.microsoft.com/office/drawing/2010/main" xmlns="">
                 <a:effectLst>
                   <a:outerShdw dist="35921" dir="2700000" algn="ctr" rotWithShape="0">
                     <a:schemeClr val="bg2"/>
@@ -5549,7 +5549,7 @@
                 <a:latin typeface="Courier New" panose="02070309020205020404" pitchFamily="49" charset="0"/>
                 <a:cs typeface="Courier New" panose="02070309020205020404" pitchFamily="49" charset="0"/>
               </a:rPr>
-              <a:t>Robust Flutter Speed: 31.2 m/s</a:t>
+              <a:t>Robust Flutter Speed: 33.7 m/s</a:t>
             </a:r>
           </a:p>
           <a:p>
@@ -5558,7 +5558,7 @@
                 <a:latin typeface="Courier New" panose="02070309020205020404" pitchFamily="49" charset="0"/>
                 <a:cs typeface="Courier New" panose="02070309020205020404" pitchFamily="49" charset="0"/>
               </a:rPr>
-              <a:t>Absolute Flutter Speed: 37.0 m/s</a:t>
+              <a:t>Absolute Flutter Speed: 37.5 m/s</a:t>
             </a:r>
           </a:p>
           <a:p>
@@ -5576,7 +5576,7 @@
                 <a:latin typeface="Courier New" panose="02070309020205020404" pitchFamily="49" charset="0"/>
                 <a:cs typeface="Courier New" panose="02070309020205020404" pitchFamily="49" charset="0"/>
               </a:rPr>
-              <a:t>   RFS due to PM at Input: 33.8 m/s</a:t>
+              <a:t>   RFS due to PM at Input: 34.5 m/s</a:t>
             </a:r>
           </a:p>
           <a:p>
@@ -5585,16 +5585,7 @@
                 <a:latin typeface="Courier New" panose="02070309020205020404" pitchFamily="49" charset="0"/>
                 <a:cs typeface="Courier New" panose="02070309020205020404" pitchFamily="49" charset="0"/>
               </a:rPr>
-              <a:t>   RFS due to GM at Input: 34.8 m/s</a:t>
-            </a:r>
-          </a:p>
-          <a:p>
-            <a:r>
-              <a:rPr lang="en-US" sz="1400" dirty="0">
-                <a:latin typeface="Courier New" panose="02070309020205020404" pitchFamily="49" charset="0"/>
-                <a:cs typeface="Courier New" panose="02070309020205020404" pitchFamily="49" charset="0"/>
-              </a:rPr>
-              <a:t>   RFS due to PM at Output: 33.3 m/s</a:t>
+              <a:t>   RFS due to GM at Input: 35.7 m/s</a:t>
             </a:r>
           </a:p>
           <a:p>
@@ -5613,7 +5604,16 @@
                 <a:latin typeface="Courier New" panose="02070309020205020404" pitchFamily="49" charset="0"/>
                 <a:cs typeface="Courier New" panose="02070309020205020404" pitchFamily="49" charset="0"/>
               </a:rPr>
-              <a:t>RFS due to GM at Output: 31.2 m/s</a:t>
+              <a:t>RFS due to PM at Output: 33.7 m/s</a:t>
+            </a:r>
+          </a:p>
+          <a:p>
+            <a:r>
+              <a:rPr lang="en-US" sz="1400" dirty="0">
+                <a:latin typeface="Courier New" panose="02070309020205020404" pitchFamily="49" charset="0"/>
+                <a:cs typeface="Courier New" panose="02070309020205020404" pitchFamily="49" charset="0"/>
+              </a:rPr>
+              <a:t>   RFS due to GM at Output: 34.4 m/s</a:t>
             </a:r>
           </a:p>
           <a:p>
@@ -5632,17 +5632,17 @@
                 <a:latin typeface="Courier New" panose="02070309020205020404" pitchFamily="49" charset="0"/>
                 <a:cs typeface="Courier New" panose="02070309020205020404" pitchFamily="49" charset="0"/>
               </a:rPr>
-              <a:t>RFS due to GM at Multi-Input: 32.5 m/s</a:t>
+              <a:t>RFS due to GM at Multi-Input: 34.2 m/s</a:t>
             </a:r>
           </a:p>
         </p:txBody>
       </p:sp>
       <p:pic>
         <p:nvPicPr>
-          <p:cNvPr id="7" name="Picture 6">
-            <a:extLst>
-              <a:ext uri="{FF2B5EF4-FFF2-40B4-BE49-F238E27FC236}">
-                <a16:creationId xmlns:a16="http://schemas.microsoft.com/office/drawing/2014/main" id="{FECB10F5-479E-48E5-B5F5-DBB34036376D}"/>
+          <p:cNvPr id="3" name="Picture 2">
+            <a:extLst>
+              <a:ext uri="{FF2B5EF4-FFF2-40B4-BE49-F238E27FC236}">
+                <a16:creationId xmlns:a16="http://schemas.microsoft.com/office/drawing/2014/main" id="{31FF6DD8-2321-4D41-B94C-75D608E22715}"/>
               </a:ext>
             </a:extLst>
           </p:cNvPr>
@@ -5659,7 +5659,7 @@
         </p:blipFill>
         <p:spPr>
           <a:xfrm>
-            <a:off x="5978591" y="3642938"/>
+            <a:off x="5978591" y="3572674"/>
             <a:ext cx="6162301" cy="2920200"/>
           </a:xfrm>
           <a:prstGeom prst="rect">

</xml_diff>